<commit_message>
Improved architecture with new instance and Load Balancer. Splitted configuration files
</commit_message>
<xml_diff>
--- a/images/Architeture.pptx
+++ b/images/Architeture.pptx
@@ -104,6 +104,11 @@
       </a:defRPr>
     </a:lvl9pPr>
   </p:defaultTextStyle>
+  <p:extLst>
+    <p:ext uri="{EFAFB233-063F-42B5-8137-9DF3F51BA10A}">
+      <p15:sldGuideLst xmlns:p15="http://schemas.microsoft.com/office/powerpoint/2012/main"/>
+    </p:ext>
+  </p:extLst>
 </p:presentation>
 </file>
 
@@ -254,7 +259,7 @@
           <a:p>
             <a:fld id="{B6A9CAD7-032E-4C56-B28C-318EEF5BE7BD}" type="datetimeFigureOut">
               <a:rPr lang="pt-BR" smtClean="0"/>
-              <a:t>29/07/2022</a:t>
+              <a:t>31/07/2022</a:t>
             </a:fld>
             <a:endParaRPr lang="pt-BR"/>
           </a:p>
@@ -452,7 +457,7 @@
           <a:p>
             <a:fld id="{B6A9CAD7-032E-4C56-B28C-318EEF5BE7BD}" type="datetimeFigureOut">
               <a:rPr lang="pt-BR" smtClean="0"/>
-              <a:t>29/07/2022</a:t>
+              <a:t>31/07/2022</a:t>
             </a:fld>
             <a:endParaRPr lang="pt-BR"/>
           </a:p>
@@ -660,7 +665,7 @@
           <a:p>
             <a:fld id="{B6A9CAD7-032E-4C56-B28C-318EEF5BE7BD}" type="datetimeFigureOut">
               <a:rPr lang="pt-BR" smtClean="0"/>
-              <a:t>29/07/2022</a:t>
+              <a:t>31/07/2022</a:t>
             </a:fld>
             <a:endParaRPr lang="pt-BR"/>
           </a:p>
@@ -1055,7 +1060,7 @@
           <a:p>
             <a:fld id="{B6A9CAD7-032E-4C56-B28C-318EEF5BE7BD}" type="datetimeFigureOut">
               <a:rPr lang="pt-BR" smtClean="0"/>
-              <a:t>29/07/2022</a:t>
+              <a:t>31/07/2022</a:t>
             </a:fld>
             <a:endParaRPr lang="pt-BR"/>
           </a:p>
@@ -1330,7 +1335,7 @@
           <a:p>
             <a:fld id="{B6A9CAD7-032E-4C56-B28C-318EEF5BE7BD}" type="datetimeFigureOut">
               <a:rPr lang="pt-BR" smtClean="0"/>
-              <a:t>29/07/2022</a:t>
+              <a:t>31/07/2022</a:t>
             </a:fld>
             <a:endParaRPr lang="pt-BR"/>
           </a:p>
@@ -1595,7 +1600,7 @@
           <a:p>
             <a:fld id="{B6A9CAD7-032E-4C56-B28C-318EEF5BE7BD}" type="datetimeFigureOut">
               <a:rPr lang="pt-BR" smtClean="0"/>
-              <a:t>29/07/2022</a:t>
+              <a:t>31/07/2022</a:t>
             </a:fld>
             <a:endParaRPr lang="pt-BR"/>
           </a:p>
@@ -2007,7 +2012,7 @@
           <a:p>
             <a:fld id="{B6A9CAD7-032E-4C56-B28C-318EEF5BE7BD}" type="datetimeFigureOut">
               <a:rPr lang="pt-BR" smtClean="0"/>
-              <a:t>29/07/2022</a:t>
+              <a:t>31/07/2022</a:t>
             </a:fld>
             <a:endParaRPr lang="pt-BR"/>
           </a:p>
@@ -2148,7 +2153,7 @@
           <a:p>
             <a:fld id="{B6A9CAD7-032E-4C56-B28C-318EEF5BE7BD}" type="datetimeFigureOut">
               <a:rPr lang="pt-BR" smtClean="0"/>
-              <a:t>29/07/2022</a:t>
+              <a:t>31/07/2022</a:t>
             </a:fld>
             <a:endParaRPr lang="pt-BR"/>
           </a:p>
@@ -2261,7 +2266,7 @@
           <a:p>
             <a:fld id="{B6A9CAD7-032E-4C56-B28C-318EEF5BE7BD}" type="datetimeFigureOut">
               <a:rPr lang="pt-BR" smtClean="0"/>
-              <a:t>29/07/2022</a:t>
+              <a:t>31/07/2022</a:t>
             </a:fld>
             <a:endParaRPr lang="pt-BR"/>
           </a:p>
@@ -2572,7 +2577,7 @@
           <a:p>
             <a:fld id="{B6A9CAD7-032E-4C56-B28C-318EEF5BE7BD}" type="datetimeFigureOut">
               <a:rPr lang="pt-BR" smtClean="0"/>
-              <a:t>29/07/2022</a:t>
+              <a:t>31/07/2022</a:t>
             </a:fld>
             <a:endParaRPr lang="pt-BR"/>
           </a:p>
@@ -2860,7 +2865,7 @@
           <a:p>
             <a:fld id="{B6A9CAD7-032E-4C56-B28C-318EEF5BE7BD}" type="datetimeFigureOut">
               <a:rPr lang="pt-BR" smtClean="0"/>
-              <a:t>29/07/2022</a:t>
+              <a:t>31/07/2022</a:t>
             </a:fld>
             <a:endParaRPr lang="pt-BR"/>
           </a:p>
@@ -3101,7 +3106,7 @@
           <a:p>
             <a:fld id="{B6A9CAD7-032E-4C56-B28C-318EEF5BE7BD}" type="datetimeFigureOut">
               <a:rPr lang="pt-BR" smtClean="0"/>
-              <a:t>29/07/2022</a:t>
+              <a:t>31/07/2022</a:t>
             </a:fld>
             <a:endParaRPr lang="pt-BR"/>
           </a:p>
@@ -3696,12 +3701,401 @@
           </a:p>
         </p:txBody>
       </p:sp>
+      <p:sp>
+        <p:nvSpPr>
+          <p:cNvPr id="42" name="Rectangle 5">
+            <a:extLst>
+              <a:ext uri="{FF2B5EF4-FFF2-40B4-BE49-F238E27FC236}">
+                <a16:creationId xmlns:a16="http://schemas.microsoft.com/office/drawing/2014/main" id="{1ABA8BC9-E0EC-7D1D-06CE-C7345ACE0C16}"/>
+              </a:ext>
+            </a:extLst>
+          </p:cNvPr>
+          <p:cNvSpPr>
+            <a:spLocks noChangeArrowheads="1"/>
+          </p:cNvSpPr>
+          <p:nvPr/>
+        </p:nvSpPr>
+        <p:spPr bwMode="auto">
+          <a:xfrm>
+            <a:off x="7957450" y="2365711"/>
+            <a:ext cx="2730255" cy="3284041"/>
+          </a:xfrm>
+          <a:prstGeom prst="rect">
+            <a:avLst/>
+          </a:prstGeom>
+          <a:noFill/>
+          <a:ln>
+            <a:noFill/>
+          </a:ln>
+          <a:extLst>
+            <a:ext uri="{909E8E84-426E-40DD-AFC4-6F175D3DCCD1}">
+              <a14:hiddenFill xmlns:a14="http://schemas.microsoft.com/office/drawing/2010/main">
+                <a:solidFill>
+                  <a:srgbClr val="FFFFFF"/>
+                </a:solidFill>
+              </a14:hiddenFill>
+            </a:ext>
+            <a:ext uri="{91240B29-F687-4F45-9708-019B960494DF}">
+              <a14:hiddenLine xmlns:a14="http://schemas.microsoft.com/office/drawing/2010/main" w="9525">
+                <a:solidFill>
+                  <a:srgbClr val="000000"/>
+                </a:solidFill>
+                <a:miter lim="800000"/>
+                <a:headEnd/>
+                <a:tailEnd/>
+              </a14:hiddenLine>
+            </a:ext>
+          </a:extLst>
+        </p:spPr>
+        <p:txBody>
+          <a:bodyPr wrap="square">
+            <a:spAutoFit/>
+          </a:bodyPr>
+          <a:lstStyle>
+            <a:lvl1pPr marL="228600" indent="-228600">
+              <a:defRPr>
+                <a:solidFill>
+                  <a:schemeClr val="tx1"/>
+                </a:solidFill>
+                <a:latin typeface="Calibri" panose="020F0502020204030204" pitchFamily="34" charset="0"/>
+              </a:defRPr>
+            </a:lvl1pPr>
+            <a:lvl2pPr marL="742950" indent="-285750">
+              <a:defRPr>
+                <a:solidFill>
+                  <a:schemeClr val="tx1"/>
+                </a:solidFill>
+                <a:latin typeface="Calibri" panose="020F0502020204030204" pitchFamily="34" charset="0"/>
+              </a:defRPr>
+            </a:lvl2pPr>
+            <a:lvl3pPr marL="1143000" indent="-228600">
+              <a:defRPr>
+                <a:solidFill>
+                  <a:schemeClr val="tx1"/>
+                </a:solidFill>
+                <a:latin typeface="Calibri" panose="020F0502020204030204" pitchFamily="34" charset="0"/>
+              </a:defRPr>
+            </a:lvl3pPr>
+            <a:lvl4pPr marL="1600200" indent="-228600">
+              <a:defRPr>
+                <a:solidFill>
+                  <a:schemeClr val="tx1"/>
+                </a:solidFill>
+                <a:latin typeface="Calibri" panose="020F0502020204030204" pitchFamily="34" charset="0"/>
+              </a:defRPr>
+            </a:lvl4pPr>
+            <a:lvl5pPr marL="2057400" indent="-228600">
+              <a:defRPr>
+                <a:solidFill>
+                  <a:schemeClr val="tx1"/>
+                </a:solidFill>
+                <a:latin typeface="Calibri" panose="020F0502020204030204" pitchFamily="34" charset="0"/>
+              </a:defRPr>
+            </a:lvl5pPr>
+            <a:lvl6pPr marL="2514600" indent="-228600" eaLnBrk="0" fontAlgn="base" hangingPunct="0">
+              <a:spcBef>
+                <a:spcPct val="0"/>
+              </a:spcBef>
+              <a:spcAft>
+                <a:spcPct val="0"/>
+              </a:spcAft>
+              <a:defRPr>
+                <a:solidFill>
+                  <a:schemeClr val="tx1"/>
+                </a:solidFill>
+                <a:latin typeface="Calibri" panose="020F0502020204030204" pitchFamily="34" charset="0"/>
+              </a:defRPr>
+            </a:lvl6pPr>
+            <a:lvl7pPr marL="2971800" indent="-228600" eaLnBrk="0" fontAlgn="base" hangingPunct="0">
+              <a:spcBef>
+                <a:spcPct val="0"/>
+              </a:spcBef>
+              <a:spcAft>
+                <a:spcPct val="0"/>
+              </a:spcAft>
+              <a:defRPr>
+                <a:solidFill>
+                  <a:schemeClr val="tx1"/>
+                </a:solidFill>
+                <a:latin typeface="Calibri" panose="020F0502020204030204" pitchFamily="34" charset="0"/>
+              </a:defRPr>
+            </a:lvl7pPr>
+            <a:lvl8pPr marL="3429000" indent="-228600" eaLnBrk="0" fontAlgn="base" hangingPunct="0">
+              <a:spcBef>
+                <a:spcPct val="0"/>
+              </a:spcBef>
+              <a:spcAft>
+                <a:spcPct val="0"/>
+              </a:spcAft>
+              <a:defRPr>
+                <a:solidFill>
+                  <a:schemeClr val="tx1"/>
+                </a:solidFill>
+                <a:latin typeface="Calibri" panose="020F0502020204030204" pitchFamily="34" charset="0"/>
+              </a:defRPr>
+            </a:lvl8pPr>
+            <a:lvl9pPr marL="3886200" indent="-228600" eaLnBrk="0" fontAlgn="base" hangingPunct="0">
+              <a:spcBef>
+                <a:spcPct val="0"/>
+              </a:spcBef>
+              <a:spcAft>
+                <a:spcPct val="0"/>
+              </a:spcAft>
+              <a:defRPr>
+                <a:solidFill>
+                  <a:schemeClr val="tx1"/>
+                </a:solidFill>
+                <a:latin typeface="Calibri" panose="020F0502020204030204" pitchFamily="34" charset="0"/>
+              </a:defRPr>
+            </a:lvl9pPr>
+          </a:lstStyle>
+          <a:p>
+            <a:pPr eaLnBrk="1" hangingPunct="1">
+              <a:lnSpc>
+                <a:spcPct val="150000"/>
+              </a:lnSpc>
+              <a:buFontTx/>
+              <a:buAutoNum type="arabicPeriod"/>
+            </a:pPr>
+            <a:r>
+              <a:rPr lang="en-US" altLang="en-US" sz="1400" dirty="0">
+                <a:latin typeface="Arial" panose="020B0604020202020204" pitchFamily="34" charset="0"/>
+                <a:cs typeface="Arial" panose="020B0604020202020204" pitchFamily="34" charset="0"/>
+              </a:rPr>
+              <a:t>AWS us-east-1.</a:t>
+            </a:r>
+          </a:p>
+          <a:p>
+            <a:pPr>
+              <a:lnSpc>
+                <a:spcPct val="150000"/>
+              </a:lnSpc>
+              <a:buFontTx/>
+              <a:buAutoNum type="arabicPeriod"/>
+            </a:pPr>
+            <a:r>
+              <a:rPr lang="en-US" altLang="en-US" sz="1400" dirty="0">
+                <a:latin typeface="Arial" panose="020B0604020202020204" pitchFamily="34" charset="0"/>
+                <a:cs typeface="Arial" panose="020B0604020202020204" pitchFamily="34" charset="0"/>
+              </a:rPr>
+              <a:t>VPC: </a:t>
+            </a:r>
+            <a:r>
+              <a:rPr lang="pt-BR" sz="1400" dirty="0">
+                <a:latin typeface="Arial" panose="020B0604020202020204" pitchFamily="34" charset="0"/>
+                <a:cs typeface="Arial" panose="020B0604020202020204" pitchFamily="34" charset="0"/>
+              </a:rPr>
+              <a:t>10.0.0.0/16.</a:t>
+            </a:r>
+          </a:p>
+          <a:p>
+            <a:pPr>
+              <a:lnSpc>
+                <a:spcPct val="150000"/>
+              </a:lnSpc>
+              <a:buFontTx/>
+              <a:buAutoNum type="arabicPeriod"/>
+            </a:pPr>
+            <a:r>
+              <a:rPr lang="pt-BR" sz="1400" dirty="0" err="1">
+                <a:latin typeface="Arial" panose="020B0604020202020204" pitchFamily="34" charset="0"/>
+                <a:cs typeface="Arial" panose="020B0604020202020204" pitchFamily="34" charset="0"/>
+              </a:rPr>
+              <a:t>Public</a:t>
+            </a:r>
+            <a:r>
+              <a:rPr lang="pt-BR" sz="1400" dirty="0">
+                <a:latin typeface="Arial" panose="020B0604020202020204" pitchFamily="34" charset="0"/>
+                <a:cs typeface="Arial" panose="020B0604020202020204" pitchFamily="34" charset="0"/>
+              </a:rPr>
+              <a:t> </a:t>
+            </a:r>
+            <a:r>
+              <a:rPr lang="pt-BR" sz="1400" dirty="0" err="1">
+                <a:latin typeface="Arial" panose="020B0604020202020204" pitchFamily="34" charset="0"/>
+                <a:cs typeface="Arial" panose="020B0604020202020204" pitchFamily="34" charset="0"/>
+              </a:rPr>
+              <a:t>subnet</a:t>
+            </a:r>
+            <a:r>
+              <a:rPr lang="pt-BR" sz="1400" dirty="0">
+                <a:latin typeface="Arial" panose="020B0604020202020204" pitchFamily="34" charset="0"/>
+                <a:cs typeface="Arial" panose="020B0604020202020204" pitchFamily="34" charset="0"/>
+              </a:rPr>
+              <a:t>: 10.0.0.0/24 </a:t>
+            </a:r>
+            <a:r>
+              <a:rPr lang="pt-BR" sz="1400" dirty="0" err="1">
+                <a:latin typeface="Arial" panose="020B0604020202020204" pitchFamily="34" charset="0"/>
+                <a:cs typeface="Arial" panose="020B0604020202020204" pitchFamily="34" charset="0"/>
+              </a:rPr>
+              <a:t>and</a:t>
+            </a:r>
+            <a:r>
+              <a:rPr lang="pt-BR" sz="1400" dirty="0">
+                <a:latin typeface="Arial" panose="020B0604020202020204" pitchFamily="34" charset="0"/>
+                <a:cs typeface="Arial" panose="020B0604020202020204" pitchFamily="34" charset="0"/>
+              </a:rPr>
+              <a:t> </a:t>
+            </a:r>
+            <a:r>
+              <a:rPr lang="en-US" altLang="en-US" sz="1400" dirty="0">
+                <a:solidFill>
+                  <a:srgbClr val="1E8900"/>
+                </a:solidFill>
+                <a:latin typeface="Arial" panose="020B0604020202020204" pitchFamily="34" charset="0"/>
+                <a:cs typeface="Arial" panose="020B0604020202020204" pitchFamily="34" charset="0"/>
+              </a:rPr>
+              <a:t>10.0.1.0/24</a:t>
+            </a:r>
+            <a:endParaRPr lang="pt-BR" sz="1400" dirty="0">
+              <a:latin typeface="Arial" panose="020B0604020202020204" pitchFamily="34" charset="0"/>
+              <a:cs typeface="Arial" panose="020B0604020202020204" pitchFamily="34" charset="0"/>
+            </a:endParaRPr>
+          </a:p>
+          <a:p>
+            <a:pPr>
+              <a:lnSpc>
+                <a:spcPct val="150000"/>
+              </a:lnSpc>
+              <a:buFontTx/>
+              <a:buAutoNum type="arabicPeriod"/>
+            </a:pPr>
+            <a:r>
+              <a:rPr lang="pt-BR" sz="1400" dirty="0">
+                <a:latin typeface="Arial" panose="020B0604020202020204" pitchFamily="34" charset="0"/>
+                <a:cs typeface="Arial" panose="020B0604020202020204" pitchFamily="34" charset="0"/>
+              </a:rPr>
+              <a:t>Security </a:t>
+            </a:r>
+            <a:r>
+              <a:rPr lang="pt-BR" sz="1400" dirty="0" err="1">
+                <a:latin typeface="Arial" panose="020B0604020202020204" pitchFamily="34" charset="0"/>
+                <a:cs typeface="Arial" panose="020B0604020202020204" pitchFamily="34" charset="0"/>
+              </a:rPr>
+              <a:t>group</a:t>
+            </a:r>
+            <a:r>
+              <a:rPr lang="pt-BR" sz="1400" dirty="0">
+                <a:latin typeface="Arial" panose="020B0604020202020204" pitchFamily="34" charset="0"/>
+                <a:cs typeface="Arial" panose="020B0604020202020204" pitchFamily="34" charset="0"/>
+              </a:rPr>
+              <a:t>: </a:t>
+            </a:r>
+            <a:r>
+              <a:rPr lang="pt-BR" sz="1400" dirty="0" err="1">
+                <a:latin typeface="Arial" panose="020B0604020202020204" pitchFamily="34" charset="0"/>
+                <a:cs typeface="Arial" panose="020B0604020202020204" pitchFamily="34" charset="0"/>
+              </a:rPr>
+              <a:t>Nginx</a:t>
+            </a:r>
+            <a:endParaRPr lang="pt-BR" sz="1400" dirty="0">
+              <a:latin typeface="Arial" panose="020B0604020202020204" pitchFamily="34" charset="0"/>
+              <a:cs typeface="Arial" panose="020B0604020202020204" pitchFamily="34" charset="0"/>
+            </a:endParaRPr>
+          </a:p>
+          <a:p>
+            <a:pPr>
+              <a:lnSpc>
+                <a:spcPct val="150000"/>
+              </a:lnSpc>
+              <a:buFontTx/>
+              <a:buAutoNum type="arabicPeriod"/>
+            </a:pPr>
+            <a:r>
+              <a:rPr lang="pt-BR" sz="1400" b="0" dirty="0" err="1">
+                <a:solidFill>
+                  <a:srgbClr val="9CDCFE"/>
+                </a:solidFill>
+                <a:effectLst/>
+                <a:latin typeface="Consolas" panose="020B0609020204030204" pitchFamily="49" charset="0"/>
+              </a:rPr>
+              <a:t>Instance</a:t>
+            </a:r>
+            <a:r>
+              <a:rPr lang="pt-BR" sz="1400" b="0" dirty="0">
+                <a:solidFill>
+                  <a:srgbClr val="9CDCFE"/>
+                </a:solidFill>
+                <a:effectLst/>
+                <a:latin typeface="Consolas" panose="020B0609020204030204" pitchFamily="49" charset="0"/>
+              </a:rPr>
+              <a:t>: </a:t>
+            </a:r>
+            <a:r>
+              <a:rPr lang="pt-BR" sz="1400" b="0" dirty="0">
+                <a:solidFill>
+                  <a:srgbClr val="CE9178"/>
+                </a:solidFill>
+                <a:effectLst/>
+                <a:latin typeface="Consolas" panose="020B0609020204030204" pitchFamily="49" charset="0"/>
+              </a:rPr>
+              <a:t>t2.micro</a:t>
+            </a:r>
+          </a:p>
+          <a:p>
+            <a:pPr>
+              <a:lnSpc>
+                <a:spcPct val="150000"/>
+              </a:lnSpc>
+              <a:buFontTx/>
+              <a:buAutoNum type="arabicPeriod"/>
+            </a:pPr>
+            <a:r>
+              <a:rPr lang="pt-BR" sz="1400" b="0" dirty="0">
+                <a:solidFill>
+                  <a:srgbClr val="CE9178"/>
+                </a:solidFill>
+                <a:effectLst/>
+                <a:latin typeface="Consolas" panose="020B0609020204030204" pitchFamily="49" charset="0"/>
+              </a:rPr>
+              <a:t>Ami: amzn2-ami-hvm-x86_64-gp2</a:t>
+            </a:r>
+            <a:endParaRPr lang="pt-BR" sz="1400" b="0" dirty="0">
+              <a:solidFill>
+                <a:srgbClr val="D4D4D4"/>
+              </a:solidFill>
+              <a:effectLst/>
+              <a:latin typeface="Consolas" panose="020B0609020204030204" pitchFamily="49" charset="0"/>
+            </a:endParaRPr>
+          </a:p>
+          <a:p>
+            <a:pPr>
+              <a:lnSpc>
+                <a:spcPct val="150000"/>
+              </a:lnSpc>
+              <a:buFontTx/>
+              <a:buAutoNum type="arabicPeriod"/>
+            </a:pPr>
+            <a:endParaRPr lang="pt-BR" sz="1400" b="0" dirty="0">
+              <a:solidFill>
+                <a:srgbClr val="D4D4D4"/>
+              </a:solidFill>
+              <a:effectLst/>
+              <a:latin typeface="Consolas" panose="020B0609020204030204" pitchFamily="49" charset="0"/>
+            </a:endParaRPr>
+          </a:p>
+          <a:p>
+            <a:pPr>
+              <a:lnSpc>
+                <a:spcPct val="150000"/>
+              </a:lnSpc>
+              <a:buFontTx/>
+              <a:buAutoNum type="arabicPeriod"/>
+            </a:pPr>
+            <a:endParaRPr lang="pt-BR" sz="1400" dirty="0">
+              <a:latin typeface="Arial" panose="020B0604020202020204" pitchFamily="34" charset="0"/>
+              <a:cs typeface="Arial" panose="020B0604020202020204" pitchFamily="34" charset="0"/>
+            </a:endParaRPr>
+          </a:p>
+        </p:txBody>
+      </p:sp>
       <p:grpSp>
         <p:nvGrpSpPr>
-          <p:cNvPr id="11" name="Agrupar 10">
-            <a:extLst>
-              <a:ext uri="{FF2B5EF4-FFF2-40B4-BE49-F238E27FC236}">
-                <a16:creationId xmlns:a16="http://schemas.microsoft.com/office/drawing/2014/main" id="{38E51FA7-38E1-30A7-3B48-D16BA19C760F}"/>
+          <p:cNvPr id="3" name="Agrupar 2">
+            <a:extLst>
+              <a:ext uri="{FF2B5EF4-FFF2-40B4-BE49-F238E27FC236}">
+                <a16:creationId xmlns:a16="http://schemas.microsoft.com/office/drawing/2014/main" id="{EDF7F538-8FCF-9B73-6BF2-BDA6F71A2237}"/>
               </a:ext>
             </a:extLst>
           </p:cNvPr>
@@ -3718,10 +4112,10 @@
         </p:grpSpPr>
         <p:sp>
           <p:nvSpPr>
-            <p:cNvPr id="7" name="Rectangle 6">
+            <p:cNvPr id="22" name="Rectangle 8">
               <a:extLst>
                 <a:ext uri="{FF2B5EF4-FFF2-40B4-BE49-F238E27FC236}">
-                  <a16:creationId xmlns:a16="http://schemas.microsoft.com/office/drawing/2014/main" id="{1E7826C6-127B-3342-99AA-A8BE44F73727}"/>
+                  <a16:creationId xmlns:a16="http://schemas.microsoft.com/office/drawing/2014/main" id="{7E674FBE-4494-E5C6-120A-FF4335491EF5}"/>
                 </a:ext>
               </a:extLst>
             </p:cNvPr>
@@ -3730,147 +4124,8 @@
           </p:nvSpPr>
           <p:spPr>
             <a:xfrm>
-              <a:off x="361988" y="1353328"/>
-              <a:ext cx="7144835" cy="3369814"/>
-            </a:xfrm>
-            <a:prstGeom prst="rect">
-              <a:avLst/>
-            </a:prstGeom>
-            <a:noFill/>
-            <a:ln w="12700">
-              <a:solidFill>
-                <a:srgbClr val="1E8900"/>
-              </a:solidFill>
-            </a:ln>
-          </p:spPr>
-          <p:style>
-            <a:lnRef idx="2">
-              <a:schemeClr val="accent1">
-                <a:shade val="50000"/>
-              </a:schemeClr>
-            </a:lnRef>
-            <a:fillRef idx="1">
-              <a:schemeClr val="accent1"/>
-            </a:fillRef>
-            <a:effectRef idx="0">
-              <a:schemeClr val="accent1"/>
-            </a:effectRef>
-            <a:fontRef idx="minor">
-              <a:schemeClr val="lt1"/>
-            </a:fontRef>
-          </p:style>
-          <p:txBody>
-            <a:bodyPr lIns="502920" tIns="91440"/>
-            <a:lstStyle/>
-            <a:p>
-              <a:pPr eaLnBrk="1" fontAlgn="auto" hangingPunct="1">
-                <a:spcBef>
-                  <a:spcPts val="0"/>
-                </a:spcBef>
-                <a:spcAft>
-                  <a:spcPts val="0"/>
-                </a:spcAft>
-                <a:defRPr/>
-              </a:pPr>
-              <a:r>
-                <a:rPr lang="en-US" sz="1200" dirty="0">
-                  <a:ln w="0"/>
-                  <a:solidFill>
-                    <a:srgbClr val="1E8900"/>
-                  </a:solidFill>
-                  <a:latin typeface="Arial" panose="020B0604020202020204" pitchFamily="34" charset="0"/>
-                  <a:cs typeface="Arial" panose="020B0604020202020204" pitchFamily="34" charset="0"/>
-                </a:rPr>
-                <a:t>VPC</a:t>
-              </a:r>
-            </a:p>
-          </p:txBody>
-        </p:sp>
-        <p:sp>
-          <p:nvSpPr>
-            <p:cNvPr id="8" name="Rectangle 7">
-              <a:extLst>
-                <a:ext uri="{FF2B5EF4-FFF2-40B4-BE49-F238E27FC236}">
-                  <a16:creationId xmlns:a16="http://schemas.microsoft.com/office/drawing/2014/main" id="{18062300-94E2-5A41-AEB0-434325DED40E}"/>
-                </a:ext>
-              </a:extLst>
-            </p:cNvPr>
-            <p:cNvSpPr/>
-            <p:nvPr/>
-          </p:nvSpPr>
-          <p:spPr>
-            <a:xfrm>
-              <a:off x="147951" y="521158"/>
-              <a:ext cx="7580608" cy="4576936"/>
-            </a:xfrm>
-            <a:prstGeom prst="rect">
-              <a:avLst/>
-            </a:prstGeom>
-            <a:noFill/>
-            <a:ln w="12700">
-              <a:solidFill>
-                <a:schemeClr val="tx1"/>
-              </a:solidFill>
-            </a:ln>
-          </p:spPr>
-          <p:style>
-            <a:lnRef idx="2">
-              <a:schemeClr val="accent1">
-                <a:shade val="50000"/>
-              </a:schemeClr>
-            </a:lnRef>
-            <a:fillRef idx="1">
-              <a:schemeClr val="accent1"/>
-            </a:fillRef>
-            <a:effectRef idx="0">
-              <a:schemeClr val="accent1"/>
-            </a:effectRef>
-            <a:fontRef idx="minor">
-              <a:schemeClr val="lt1"/>
-            </a:fontRef>
-          </p:style>
-          <p:txBody>
-            <a:bodyPr lIns="502920" tIns="91440"/>
-            <a:lstStyle/>
-            <a:p>
-              <a:pPr eaLnBrk="1" fontAlgn="auto" hangingPunct="1">
-                <a:spcBef>
-                  <a:spcPts val="0"/>
-                </a:spcBef>
-                <a:spcAft>
-                  <a:spcPts val="0"/>
-                </a:spcAft>
-                <a:defRPr/>
-              </a:pPr>
-              <a:r>
-                <a:rPr lang="en-US" sz="1200" dirty="0">
-                  <a:solidFill>
-                    <a:sysClr val="windowText" lastClr="000000"/>
-                  </a:solidFill>
-                  <a:latin typeface="Arial" panose="020B0604020202020204" pitchFamily="34" charset="0"/>
-                  <a:cs typeface="Arial" panose="020B0604020202020204" pitchFamily="34" charset="0"/>
-                </a:rPr>
-                <a:t>AWS Cloud</a:t>
-              </a:r>
-            </a:p>
-          </p:txBody>
-        </p:sp>
-        <p:sp>
-          <p:nvSpPr>
-            <p:cNvPr id="9" name="Rectangle 8">
-              <a:extLst>
-                <a:ext uri="{FF2B5EF4-FFF2-40B4-BE49-F238E27FC236}">
-                  <a16:creationId xmlns:a16="http://schemas.microsoft.com/office/drawing/2014/main" id="{8C85C997-8D42-1E47-BFEB-FAC2C933764B}"/>
-                </a:ext>
-              </a:extLst>
-            </p:cNvPr>
-            <p:cNvSpPr/>
-            <p:nvPr/>
-          </p:nvSpPr>
-          <p:spPr>
-            <a:xfrm>
-              <a:off x="731548" y="842319"/>
-              <a:ext cx="6413414" cy="4065926"/>
+              <a:off x="4257408" y="842319"/>
+              <a:ext cx="2930780" cy="4065926"/>
             </a:xfrm>
             <a:prstGeom prst="rect">
               <a:avLst/>
@@ -3920,12 +4175,1663 @@
             </a:p>
           </p:txBody>
         </p:sp>
+        <p:grpSp>
+          <p:nvGrpSpPr>
+            <p:cNvPr id="11" name="Agrupar 10">
+              <a:extLst>
+                <a:ext uri="{FF2B5EF4-FFF2-40B4-BE49-F238E27FC236}">
+                  <a16:creationId xmlns:a16="http://schemas.microsoft.com/office/drawing/2014/main" id="{38E51FA7-38E1-30A7-3B48-D16BA19C760F}"/>
+                </a:ext>
+              </a:extLst>
+            </p:cNvPr>
+            <p:cNvGrpSpPr/>
+            <p:nvPr/>
+          </p:nvGrpSpPr>
+          <p:grpSpPr>
+            <a:xfrm>
+              <a:off x="147951" y="521158"/>
+              <a:ext cx="7580608" cy="4576936"/>
+              <a:chOff x="147951" y="521158"/>
+              <a:chExt cx="7580608" cy="4576936"/>
+            </a:xfrm>
+          </p:grpSpPr>
+          <p:sp>
+            <p:nvSpPr>
+              <p:cNvPr id="7" name="Rectangle 6">
+                <a:extLst>
+                  <a:ext uri="{FF2B5EF4-FFF2-40B4-BE49-F238E27FC236}">
+                    <a16:creationId xmlns:a16="http://schemas.microsoft.com/office/drawing/2014/main" id="{1E7826C6-127B-3342-99AA-A8BE44F73727}"/>
+                  </a:ext>
+                </a:extLst>
+              </p:cNvPr>
+              <p:cNvSpPr/>
+              <p:nvPr/>
+            </p:nvSpPr>
+            <p:spPr>
+              <a:xfrm>
+                <a:off x="361988" y="1353328"/>
+                <a:ext cx="7144835" cy="3369814"/>
+              </a:xfrm>
+              <a:prstGeom prst="rect">
+                <a:avLst/>
+              </a:prstGeom>
+              <a:noFill/>
+              <a:ln w="12700">
+                <a:solidFill>
+                  <a:srgbClr val="1E8900"/>
+                </a:solidFill>
+              </a:ln>
+            </p:spPr>
+            <p:style>
+              <a:lnRef idx="2">
+                <a:schemeClr val="accent1">
+                  <a:shade val="50000"/>
+                </a:schemeClr>
+              </a:lnRef>
+              <a:fillRef idx="1">
+                <a:schemeClr val="accent1"/>
+              </a:fillRef>
+              <a:effectRef idx="0">
+                <a:schemeClr val="accent1"/>
+              </a:effectRef>
+              <a:fontRef idx="minor">
+                <a:schemeClr val="lt1"/>
+              </a:fontRef>
+            </p:style>
+            <p:txBody>
+              <a:bodyPr lIns="502920" tIns="91440"/>
+              <a:lstStyle/>
+              <a:p>
+                <a:pPr eaLnBrk="1" fontAlgn="auto" hangingPunct="1">
+                  <a:spcBef>
+                    <a:spcPts val="0"/>
+                  </a:spcBef>
+                  <a:spcAft>
+                    <a:spcPts val="0"/>
+                  </a:spcAft>
+                  <a:defRPr/>
+                </a:pPr>
+                <a:r>
+                  <a:rPr lang="en-US" sz="1200" dirty="0">
+                    <a:ln w="0"/>
+                    <a:solidFill>
+                      <a:srgbClr val="1E8900"/>
+                    </a:solidFill>
+                    <a:latin typeface="Arial" panose="020B0604020202020204" pitchFamily="34" charset="0"/>
+                    <a:cs typeface="Arial" panose="020B0604020202020204" pitchFamily="34" charset="0"/>
+                  </a:rPr>
+                  <a:t>VPC</a:t>
+                </a:r>
+              </a:p>
+            </p:txBody>
+          </p:sp>
+          <p:sp>
+            <p:nvSpPr>
+              <p:cNvPr id="8" name="Rectangle 7">
+                <a:extLst>
+                  <a:ext uri="{FF2B5EF4-FFF2-40B4-BE49-F238E27FC236}">
+                    <a16:creationId xmlns:a16="http://schemas.microsoft.com/office/drawing/2014/main" id="{18062300-94E2-5A41-AEB0-434325DED40E}"/>
+                  </a:ext>
+                </a:extLst>
+              </p:cNvPr>
+              <p:cNvSpPr/>
+              <p:nvPr/>
+            </p:nvSpPr>
+            <p:spPr>
+              <a:xfrm>
+                <a:off x="147951" y="521158"/>
+                <a:ext cx="7580608" cy="4576936"/>
+              </a:xfrm>
+              <a:prstGeom prst="rect">
+                <a:avLst/>
+              </a:prstGeom>
+              <a:noFill/>
+              <a:ln w="12700">
+                <a:solidFill>
+                  <a:schemeClr val="tx1"/>
+                </a:solidFill>
+              </a:ln>
+            </p:spPr>
+            <p:style>
+              <a:lnRef idx="2">
+                <a:schemeClr val="accent1">
+                  <a:shade val="50000"/>
+                </a:schemeClr>
+              </a:lnRef>
+              <a:fillRef idx="1">
+                <a:schemeClr val="accent1"/>
+              </a:fillRef>
+              <a:effectRef idx="0">
+                <a:schemeClr val="accent1"/>
+              </a:effectRef>
+              <a:fontRef idx="minor">
+                <a:schemeClr val="lt1"/>
+              </a:fontRef>
+            </p:style>
+            <p:txBody>
+              <a:bodyPr lIns="502920" tIns="91440"/>
+              <a:lstStyle/>
+              <a:p>
+                <a:pPr eaLnBrk="1" fontAlgn="auto" hangingPunct="1">
+                  <a:spcBef>
+                    <a:spcPts val="0"/>
+                  </a:spcBef>
+                  <a:spcAft>
+                    <a:spcPts val="0"/>
+                  </a:spcAft>
+                  <a:defRPr/>
+                </a:pPr>
+                <a:r>
+                  <a:rPr lang="en-US" sz="1200" dirty="0">
+                    <a:solidFill>
+                      <a:sysClr val="windowText" lastClr="000000"/>
+                    </a:solidFill>
+                    <a:latin typeface="Arial" panose="020B0604020202020204" pitchFamily="34" charset="0"/>
+                    <a:cs typeface="Arial" panose="020B0604020202020204" pitchFamily="34" charset="0"/>
+                  </a:rPr>
+                  <a:t>AWS Cloud</a:t>
+                </a:r>
+              </a:p>
+            </p:txBody>
+          </p:sp>
+          <p:sp>
+            <p:nvSpPr>
+              <p:cNvPr id="9" name="Rectangle 8">
+                <a:extLst>
+                  <a:ext uri="{FF2B5EF4-FFF2-40B4-BE49-F238E27FC236}">
+                    <a16:creationId xmlns:a16="http://schemas.microsoft.com/office/drawing/2014/main" id="{8C85C997-8D42-1E47-BFEB-FAC2C933764B}"/>
+                  </a:ext>
+                </a:extLst>
+              </p:cNvPr>
+              <p:cNvSpPr/>
+              <p:nvPr/>
+            </p:nvSpPr>
+            <p:spPr>
+              <a:xfrm>
+                <a:off x="731548" y="842319"/>
+                <a:ext cx="2930780" cy="4065926"/>
+              </a:xfrm>
+              <a:prstGeom prst="rect">
+                <a:avLst/>
+              </a:prstGeom>
+              <a:noFill/>
+              <a:ln w="12700">
+                <a:solidFill>
+                  <a:srgbClr val="5B9CD5"/>
+                </a:solidFill>
+                <a:prstDash val="dash"/>
+              </a:ln>
+            </p:spPr>
+            <p:style>
+              <a:lnRef idx="2">
+                <a:schemeClr val="accent1">
+                  <a:shade val="50000"/>
+                </a:schemeClr>
+              </a:lnRef>
+              <a:fillRef idx="1">
+                <a:schemeClr val="accent1"/>
+              </a:fillRef>
+              <a:effectRef idx="0">
+                <a:schemeClr val="accent1"/>
+              </a:effectRef>
+              <a:fontRef idx="minor">
+                <a:schemeClr val="lt1"/>
+              </a:fontRef>
+            </p:style>
+            <p:txBody>
+              <a:bodyPr tIns="91440"/>
+              <a:lstStyle/>
+              <a:p>
+                <a:pPr algn="ctr" eaLnBrk="1" fontAlgn="auto" hangingPunct="1">
+                  <a:spcBef>
+                    <a:spcPts val="0"/>
+                  </a:spcBef>
+                  <a:spcAft>
+                    <a:spcPts val="0"/>
+                  </a:spcAft>
+                  <a:defRPr/>
+                </a:pPr>
+                <a:endParaRPr lang="en-US" sz="1200" dirty="0">
+                  <a:solidFill>
+                    <a:schemeClr val="accent3"/>
+                  </a:solidFill>
+                </a:endParaRPr>
+              </a:p>
+            </p:txBody>
+          </p:sp>
+          <p:sp>
+            <p:nvSpPr>
+              <p:cNvPr id="13" name="Rectangle 12">
+                <a:extLst>
+                  <a:ext uri="{FF2B5EF4-FFF2-40B4-BE49-F238E27FC236}">
+                    <a16:creationId xmlns:a16="http://schemas.microsoft.com/office/drawing/2014/main" id="{3271E081-8C84-1A41-9D73-C477EECE3484}"/>
+                  </a:ext>
+                </a:extLst>
+              </p:cNvPr>
+              <p:cNvSpPr/>
+              <p:nvPr/>
+            </p:nvSpPr>
+            <p:spPr>
+              <a:xfrm>
+                <a:off x="1155692" y="1854519"/>
+                <a:ext cx="2274219" cy="2276602"/>
+              </a:xfrm>
+              <a:prstGeom prst="rect">
+                <a:avLst/>
+              </a:prstGeom>
+              <a:solidFill>
+                <a:srgbClr val="1D8900">
+                  <a:alpha val="9804"/>
+                </a:srgbClr>
+              </a:solidFill>
+              <a:ln w="12700">
+                <a:noFill/>
+                <a:prstDash val="dash"/>
+              </a:ln>
+            </p:spPr>
+            <p:style>
+              <a:lnRef idx="2">
+                <a:schemeClr val="accent1">
+                  <a:shade val="50000"/>
+                </a:schemeClr>
+              </a:lnRef>
+              <a:fillRef idx="1">
+                <a:schemeClr val="accent1"/>
+              </a:fillRef>
+              <a:effectRef idx="0">
+                <a:schemeClr val="accent1"/>
+              </a:effectRef>
+              <a:fontRef idx="minor">
+                <a:schemeClr val="lt1"/>
+              </a:fontRef>
+            </p:style>
+            <p:txBody>
+              <a:bodyPr lIns="502920"/>
+              <a:lstStyle/>
+              <a:p>
+                <a:pPr eaLnBrk="1" fontAlgn="auto" hangingPunct="1">
+                  <a:spcBef>
+                    <a:spcPts val="0"/>
+                  </a:spcBef>
+                  <a:spcAft>
+                    <a:spcPts val="0"/>
+                  </a:spcAft>
+                  <a:defRPr/>
+                </a:pPr>
+                <a:r>
+                  <a:rPr lang="en-US" sz="1200" dirty="0">
+                    <a:solidFill>
+                      <a:srgbClr val="1E8900"/>
+                    </a:solidFill>
+                    <a:latin typeface="Arial" panose="020B0604020202020204" pitchFamily="34" charset="0"/>
+                    <a:cs typeface="Arial" panose="020B0604020202020204" pitchFamily="34" charset="0"/>
+                  </a:rPr>
+                  <a:t>Public subnet 1</a:t>
+                </a:r>
+              </a:p>
+            </p:txBody>
+          </p:sp>
+          <p:sp>
+            <p:nvSpPr>
+              <p:cNvPr id="57355" name="TextBox 14">
+                <a:extLst>
+                  <a:ext uri="{FF2B5EF4-FFF2-40B4-BE49-F238E27FC236}">
+                    <a16:creationId xmlns:a16="http://schemas.microsoft.com/office/drawing/2014/main" id="{C4B73CB0-A9A3-FA4F-B5E5-8E3A6EF2BFAE}"/>
+                  </a:ext>
+                </a:extLst>
+              </p:cNvPr>
+              <p:cNvSpPr txBox="1">
+                <a:spLocks noChangeArrowheads="1"/>
+              </p:cNvSpPr>
+              <p:nvPr/>
+            </p:nvSpPr>
+            <p:spPr bwMode="auto">
+              <a:xfrm>
+                <a:off x="1366532" y="3677248"/>
+                <a:ext cx="1946352" cy="260716"/>
+              </a:xfrm>
+              <a:prstGeom prst="rect">
+                <a:avLst/>
+              </a:prstGeom>
+              <a:noFill/>
+              <a:ln>
+                <a:noFill/>
+              </a:ln>
+              <a:extLst>
+                <a:ext uri="{909E8E84-426E-40DD-AFC4-6F175D3DCCD1}">
+                  <a14:hiddenFill xmlns:a14="http://schemas.microsoft.com/office/drawing/2010/main">
+                    <a:solidFill>
+                      <a:srgbClr val="FFFFFF"/>
+                    </a:solidFill>
+                  </a14:hiddenFill>
+                </a:ext>
+                <a:ext uri="{91240B29-F687-4F45-9708-019B960494DF}">
+                  <a14:hiddenLine xmlns:a14="http://schemas.microsoft.com/office/drawing/2010/main" w="9525">
+                    <a:solidFill>
+                      <a:srgbClr val="000000"/>
+                    </a:solidFill>
+                    <a:miter lim="800000"/>
+                    <a:headEnd/>
+                    <a:tailEnd/>
+                  </a14:hiddenLine>
+                </a:ext>
+              </a:extLst>
+            </p:spPr>
+            <p:txBody>
+              <a:bodyPr>
+                <a:spAutoFit/>
+              </a:bodyPr>
+              <a:lstStyle>
+                <a:lvl1pPr>
+                  <a:defRPr>
+                    <a:solidFill>
+                      <a:schemeClr val="tx1"/>
+                    </a:solidFill>
+                    <a:latin typeface="Calibri" panose="020F0502020204030204" pitchFamily="34" charset="0"/>
+                  </a:defRPr>
+                </a:lvl1pPr>
+                <a:lvl2pPr marL="742950" indent="-285750">
+                  <a:defRPr>
+                    <a:solidFill>
+                      <a:schemeClr val="tx1"/>
+                    </a:solidFill>
+                    <a:latin typeface="Calibri" panose="020F0502020204030204" pitchFamily="34" charset="0"/>
+                  </a:defRPr>
+                </a:lvl2pPr>
+                <a:lvl3pPr marL="1143000" indent="-228600">
+                  <a:defRPr>
+                    <a:solidFill>
+                      <a:schemeClr val="tx1"/>
+                    </a:solidFill>
+                    <a:latin typeface="Calibri" panose="020F0502020204030204" pitchFamily="34" charset="0"/>
+                  </a:defRPr>
+                </a:lvl3pPr>
+                <a:lvl4pPr marL="1600200" indent="-228600">
+                  <a:defRPr>
+                    <a:solidFill>
+                      <a:schemeClr val="tx1"/>
+                    </a:solidFill>
+                    <a:latin typeface="Calibri" panose="020F0502020204030204" pitchFamily="34" charset="0"/>
+                  </a:defRPr>
+                </a:lvl4pPr>
+                <a:lvl5pPr marL="2057400" indent="-228600">
+                  <a:defRPr>
+                    <a:solidFill>
+                      <a:schemeClr val="tx1"/>
+                    </a:solidFill>
+                    <a:latin typeface="Calibri" panose="020F0502020204030204" pitchFamily="34" charset="0"/>
+                  </a:defRPr>
+                </a:lvl5pPr>
+                <a:lvl6pPr marL="2514600" indent="-228600" eaLnBrk="0" fontAlgn="base" hangingPunct="0">
+                  <a:spcBef>
+                    <a:spcPct val="0"/>
+                  </a:spcBef>
+                  <a:spcAft>
+                    <a:spcPct val="0"/>
+                  </a:spcAft>
+                  <a:defRPr>
+                    <a:solidFill>
+                      <a:schemeClr val="tx1"/>
+                    </a:solidFill>
+                    <a:latin typeface="Calibri" panose="020F0502020204030204" pitchFamily="34" charset="0"/>
+                  </a:defRPr>
+                </a:lvl6pPr>
+                <a:lvl7pPr marL="2971800" indent="-228600" eaLnBrk="0" fontAlgn="base" hangingPunct="0">
+                  <a:spcBef>
+                    <a:spcPct val="0"/>
+                  </a:spcBef>
+                  <a:spcAft>
+                    <a:spcPct val="0"/>
+                  </a:spcAft>
+                  <a:defRPr>
+                    <a:solidFill>
+                      <a:schemeClr val="tx1"/>
+                    </a:solidFill>
+                    <a:latin typeface="Calibri" panose="020F0502020204030204" pitchFamily="34" charset="0"/>
+                  </a:defRPr>
+                </a:lvl7pPr>
+                <a:lvl8pPr marL="3429000" indent="-228600" eaLnBrk="0" fontAlgn="base" hangingPunct="0">
+                  <a:spcBef>
+                    <a:spcPct val="0"/>
+                  </a:spcBef>
+                  <a:spcAft>
+                    <a:spcPct val="0"/>
+                  </a:spcAft>
+                  <a:defRPr>
+                    <a:solidFill>
+                      <a:schemeClr val="tx1"/>
+                    </a:solidFill>
+                    <a:latin typeface="Calibri" panose="020F0502020204030204" pitchFamily="34" charset="0"/>
+                  </a:defRPr>
+                </a:lvl8pPr>
+                <a:lvl9pPr marL="3886200" indent="-228600" eaLnBrk="0" fontAlgn="base" hangingPunct="0">
+                  <a:spcBef>
+                    <a:spcPct val="0"/>
+                  </a:spcBef>
+                  <a:spcAft>
+                    <a:spcPct val="0"/>
+                  </a:spcAft>
+                  <a:defRPr>
+                    <a:solidFill>
+                      <a:schemeClr val="tx1"/>
+                    </a:solidFill>
+                    <a:latin typeface="Calibri" panose="020F0502020204030204" pitchFamily="34" charset="0"/>
+                  </a:defRPr>
+                </a:lvl9pPr>
+              </a:lstStyle>
+              <a:p>
+                <a:pPr algn="ctr" eaLnBrk="1" hangingPunct="1"/>
+                <a:r>
+                  <a:rPr lang="en-US" altLang="en-US" sz="1100" dirty="0">
+                    <a:solidFill>
+                      <a:srgbClr val="1E8900"/>
+                    </a:solidFill>
+                    <a:latin typeface="Arial" panose="020B0604020202020204" pitchFamily="34" charset="0"/>
+                    <a:cs typeface="Arial" panose="020B0604020202020204" pitchFamily="34" charset="0"/>
+                  </a:rPr>
+                  <a:t>10.0.0.0/24</a:t>
+                </a:r>
+              </a:p>
+            </p:txBody>
+          </p:sp>
+          <p:pic>
+            <p:nvPicPr>
+              <p:cNvPr id="57356" name="Graphic 15">
+                <a:extLst>
+                  <a:ext uri="{FF2B5EF4-FFF2-40B4-BE49-F238E27FC236}">
+                    <a16:creationId xmlns:a16="http://schemas.microsoft.com/office/drawing/2014/main" id="{E0FCDF02-5D7E-4444-8DF1-4F770DE6D18F}"/>
+                  </a:ext>
+                </a:extLst>
+              </p:cNvPr>
+              <p:cNvPicPr>
+                <a:picLocks noChangeAspect="1" noChangeArrowheads="1"/>
+              </p:cNvPicPr>
+              <p:nvPr/>
+            </p:nvPicPr>
+            <p:blipFill>
+              <a:blip r:embed="rId2">
+                <a:extLst>
+                  <a:ext uri="{28A0092B-C50C-407E-A947-70E740481C1C}">
+                    <a14:useLocalDpi xmlns:a14="http://schemas.microsoft.com/office/drawing/2010/main" val="0"/>
+                  </a:ext>
+                </a:extLst>
+              </a:blip>
+              <a:srcRect/>
+              <a:stretch>
+                <a:fillRect/>
+              </a:stretch>
+            </p:blipFill>
+            <p:spPr bwMode="auto">
+              <a:xfrm>
+                <a:off x="2111812" y="2427373"/>
+                <a:ext cx="455791" cy="468293"/>
+              </a:xfrm>
+              <a:prstGeom prst="rect">
+                <a:avLst/>
+              </a:prstGeom>
+              <a:noFill/>
+              <a:ln>
+                <a:noFill/>
+              </a:ln>
+              <a:extLst>
+                <a:ext uri="{909E8E84-426E-40DD-AFC4-6F175D3DCCD1}">
+                  <a14:hiddenFill xmlns:a14="http://schemas.microsoft.com/office/drawing/2010/main">
+                    <a:solidFill>
+                      <a:srgbClr val="FFFFFF"/>
+                    </a:solidFill>
+                  </a14:hiddenFill>
+                </a:ext>
+                <a:ext uri="{91240B29-F687-4F45-9708-019B960494DF}">
+                  <a14:hiddenLine xmlns:a14="http://schemas.microsoft.com/office/drawing/2010/main" w="9525">
+                    <a:solidFill>
+                      <a:srgbClr val="000000"/>
+                    </a:solidFill>
+                    <a:miter lim="800000"/>
+                    <a:headEnd/>
+                    <a:tailEnd/>
+                  </a14:hiddenLine>
+                </a:ext>
+              </a:extLst>
+            </p:spPr>
+          </p:pic>
+          <p:sp>
+            <p:nvSpPr>
+              <p:cNvPr id="57359" name="TextBox 18">
+                <a:extLst>
+                  <a:ext uri="{FF2B5EF4-FFF2-40B4-BE49-F238E27FC236}">
+                    <a16:creationId xmlns:a16="http://schemas.microsoft.com/office/drawing/2014/main" id="{943B7711-2792-2B41-85BC-9287019BF532}"/>
+                  </a:ext>
+                </a:extLst>
+              </p:cNvPr>
+              <p:cNvSpPr txBox="1">
+                <a:spLocks noChangeArrowheads="1"/>
+              </p:cNvSpPr>
+              <p:nvPr/>
+            </p:nvSpPr>
+            <p:spPr bwMode="auto">
+              <a:xfrm>
+                <a:off x="3064399" y="1593803"/>
+                <a:ext cx="1715376" cy="260716"/>
+              </a:xfrm>
+              <a:prstGeom prst="rect">
+                <a:avLst/>
+              </a:prstGeom>
+              <a:noFill/>
+              <a:ln>
+                <a:noFill/>
+              </a:ln>
+              <a:extLst>
+                <a:ext uri="{909E8E84-426E-40DD-AFC4-6F175D3DCCD1}">
+                  <a14:hiddenFill xmlns:a14="http://schemas.microsoft.com/office/drawing/2010/main">
+                    <a:solidFill>
+                      <a:srgbClr val="FFFFFF"/>
+                    </a:solidFill>
+                  </a14:hiddenFill>
+                </a:ext>
+                <a:ext uri="{91240B29-F687-4F45-9708-019B960494DF}">
+                  <a14:hiddenLine xmlns:a14="http://schemas.microsoft.com/office/drawing/2010/main" w="9525">
+                    <a:solidFill>
+                      <a:srgbClr val="000000"/>
+                    </a:solidFill>
+                    <a:miter lim="800000"/>
+                    <a:headEnd/>
+                    <a:tailEnd/>
+                  </a14:hiddenLine>
+                </a:ext>
+              </a:extLst>
+            </p:spPr>
+            <p:txBody>
+              <a:bodyPr>
+                <a:spAutoFit/>
+              </a:bodyPr>
+              <a:lstStyle>
+                <a:lvl1pPr>
+                  <a:defRPr>
+                    <a:solidFill>
+                      <a:schemeClr val="tx1"/>
+                    </a:solidFill>
+                    <a:latin typeface="Calibri" panose="020F0502020204030204" pitchFamily="34" charset="0"/>
+                  </a:defRPr>
+                </a:lvl1pPr>
+                <a:lvl2pPr marL="742950" indent="-285750">
+                  <a:defRPr>
+                    <a:solidFill>
+                      <a:schemeClr val="tx1"/>
+                    </a:solidFill>
+                    <a:latin typeface="Calibri" panose="020F0502020204030204" pitchFamily="34" charset="0"/>
+                  </a:defRPr>
+                </a:lvl2pPr>
+                <a:lvl3pPr marL="1143000" indent="-228600">
+                  <a:defRPr>
+                    <a:solidFill>
+                      <a:schemeClr val="tx1"/>
+                    </a:solidFill>
+                    <a:latin typeface="Calibri" panose="020F0502020204030204" pitchFamily="34" charset="0"/>
+                  </a:defRPr>
+                </a:lvl3pPr>
+                <a:lvl4pPr marL="1600200" indent="-228600">
+                  <a:defRPr>
+                    <a:solidFill>
+                      <a:schemeClr val="tx1"/>
+                    </a:solidFill>
+                    <a:latin typeface="Calibri" panose="020F0502020204030204" pitchFamily="34" charset="0"/>
+                  </a:defRPr>
+                </a:lvl4pPr>
+                <a:lvl5pPr marL="2057400" indent="-228600">
+                  <a:defRPr>
+                    <a:solidFill>
+                      <a:schemeClr val="tx1"/>
+                    </a:solidFill>
+                    <a:latin typeface="Calibri" panose="020F0502020204030204" pitchFamily="34" charset="0"/>
+                  </a:defRPr>
+                </a:lvl5pPr>
+                <a:lvl6pPr marL="2514600" indent="-228600" eaLnBrk="0" fontAlgn="base" hangingPunct="0">
+                  <a:spcBef>
+                    <a:spcPct val="0"/>
+                  </a:spcBef>
+                  <a:spcAft>
+                    <a:spcPct val="0"/>
+                  </a:spcAft>
+                  <a:defRPr>
+                    <a:solidFill>
+                      <a:schemeClr val="tx1"/>
+                    </a:solidFill>
+                    <a:latin typeface="Calibri" panose="020F0502020204030204" pitchFamily="34" charset="0"/>
+                  </a:defRPr>
+                </a:lvl6pPr>
+                <a:lvl7pPr marL="2971800" indent="-228600" eaLnBrk="0" fontAlgn="base" hangingPunct="0">
+                  <a:spcBef>
+                    <a:spcPct val="0"/>
+                  </a:spcBef>
+                  <a:spcAft>
+                    <a:spcPct val="0"/>
+                  </a:spcAft>
+                  <a:defRPr>
+                    <a:solidFill>
+                      <a:schemeClr val="tx1"/>
+                    </a:solidFill>
+                    <a:latin typeface="Calibri" panose="020F0502020204030204" pitchFamily="34" charset="0"/>
+                  </a:defRPr>
+                </a:lvl7pPr>
+                <a:lvl8pPr marL="3429000" indent="-228600" eaLnBrk="0" fontAlgn="base" hangingPunct="0">
+                  <a:spcBef>
+                    <a:spcPct val="0"/>
+                  </a:spcBef>
+                  <a:spcAft>
+                    <a:spcPct val="0"/>
+                  </a:spcAft>
+                  <a:defRPr>
+                    <a:solidFill>
+                      <a:schemeClr val="tx1"/>
+                    </a:solidFill>
+                    <a:latin typeface="Calibri" panose="020F0502020204030204" pitchFamily="34" charset="0"/>
+                  </a:defRPr>
+                </a:lvl8pPr>
+                <a:lvl9pPr marL="3886200" indent="-228600" eaLnBrk="0" fontAlgn="base" hangingPunct="0">
+                  <a:spcBef>
+                    <a:spcPct val="0"/>
+                  </a:spcBef>
+                  <a:spcAft>
+                    <a:spcPct val="0"/>
+                  </a:spcAft>
+                  <a:defRPr>
+                    <a:solidFill>
+                      <a:schemeClr val="tx1"/>
+                    </a:solidFill>
+                    <a:latin typeface="Calibri" panose="020F0502020204030204" pitchFamily="34" charset="0"/>
+                  </a:defRPr>
+                </a:lvl9pPr>
+              </a:lstStyle>
+              <a:p>
+                <a:pPr algn="ctr" eaLnBrk="1" hangingPunct="1"/>
+                <a:r>
+                  <a:rPr lang="en-US" altLang="en-US" sz="1100" dirty="0">
+                    <a:latin typeface="Arial" panose="020B0604020202020204" pitchFamily="34" charset="0"/>
+                    <a:cs typeface="Arial" panose="020B0604020202020204" pitchFamily="34" charset="0"/>
+                  </a:rPr>
+                  <a:t>Internet gateway</a:t>
+                </a:r>
+              </a:p>
+            </p:txBody>
+          </p:sp>
+          <p:sp>
+            <p:nvSpPr>
+              <p:cNvPr id="57362" name="TextBox 21">
+                <a:extLst>
+                  <a:ext uri="{FF2B5EF4-FFF2-40B4-BE49-F238E27FC236}">
+                    <a16:creationId xmlns:a16="http://schemas.microsoft.com/office/drawing/2014/main" id="{8E1FED8B-0693-4748-A3FD-BAA06B77A775}"/>
+                  </a:ext>
+                </a:extLst>
+              </p:cNvPr>
+              <p:cNvSpPr txBox="1">
+                <a:spLocks noChangeArrowheads="1"/>
+              </p:cNvSpPr>
+              <p:nvPr/>
+            </p:nvSpPr>
+            <p:spPr bwMode="auto">
+              <a:xfrm>
+                <a:off x="1471162" y="2950627"/>
+                <a:ext cx="1715376" cy="205887"/>
+              </a:xfrm>
+              <a:prstGeom prst="rect">
+                <a:avLst/>
+              </a:prstGeom>
+              <a:noFill/>
+              <a:ln>
+                <a:noFill/>
+              </a:ln>
+              <a:extLst>
+                <a:ext uri="{909E8E84-426E-40DD-AFC4-6F175D3DCCD1}">
+                  <a14:hiddenFill xmlns:a14="http://schemas.microsoft.com/office/drawing/2010/main">
+                    <a:solidFill>
+                      <a:srgbClr val="FFFFFF"/>
+                    </a:solidFill>
+                  </a14:hiddenFill>
+                </a:ext>
+                <a:ext uri="{91240B29-F687-4F45-9708-019B960494DF}">
+                  <a14:hiddenLine xmlns:a14="http://schemas.microsoft.com/office/drawing/2010/main" w="9525">
+                    <a:solidFill>
+                      <a:srgbClr val="000000"/>
+                    </a:solidFill>
+                    <a:miter lim="800000"/>
+                    <a:headEnd/>
+                    <a:tailEnd/>
+                  </a14:hiddenLine>
+                </a:ext>
+              </a:extLst>
+            </p:spPr>
+            <p:txBody>
+              <a:bodyPr>
+                <a:spAutoFit/>
+              </a:bodyPr>
+              <a:lstStyle>
+                <a:lvl1pPr>
+                  <a:defRPr>
+                    <a:solidFill>
+                      <a:schemeClr val="tx1"/>
+                    </a:solidFill>
+                    <a:latin typeface="Calibri" panose="020F0502020204030204" pitchFamily="34" charset="0"/>
+                  </a:defRPr>
+                </a:lvl1pPr>
+                <a:lvl2pPr marL="742950" indent="-285750">
+                  <a:defRPr>
+                    <a:solidFill>
+                      <a:schemeClr val="tx1"/>
+                    </a:solidFill>
+                    <a:latin typeface="Calibri" panose="020F0502020204030204" pitchFamily="34" charset="0"/>
+                  </a:defRPr>
+                </a:lvl2pPr>
+                <a:lvl3pPr marL="1143000" indent="-228600">
+                  <a:defRPr>
+                    <a:solidFill>
+                      <a:schemeClr val="tx1"/>
+                    </a:solidFill>
+                    <a:latin typeface="Calibri" panose="020F0502020204030204" pitchFamily="34" charset="0"/>
+                  </a:defRPr>
+                </a:lvl3pPr>
+                <a:lvl4pPr marL="1600200" indent="-228600">
+                  <a:defRPr>
+                    <a:solidFill>
+                      <a:schemeClr val="tx1"/>
+                    </a:solidFill>
+                    <a:latin typeface="Calibri" panose="020F0502020204030204" pitchFamily="34" charset="0"/>
+                  </a:defRPr>
+                </a:lvl4pPr>
+                <a:lvl5pPr marL="2057400" indent="-228600">
+                  <a:defRPr>
+                    <a:solidFill>
+                      <a:schemeClr val="tx1"/>
+                    </a:solidFill>
+                    <a:latin typeface="Calibri" panose="020F0502020204030204" pitchFamily="34" charset="0"/>
+                  </a:defRPr>
+                </a:lvl5pPr>
+                <a:lvl6pPr marL="2514600" indent="-228600" eaLnBrk="0" fontAlgn="base" hangingPunct="0">
+                  <a:spcBef>
+                    <a:spcPct val="0"/>
+                  </a:spcBef>
+                  <a:spcAft>
+                    <a:spcPct val="0"/>
+                  </a:spcAft>
+                  <a:defRPr>
+                    <a:solidFill>
+                      <a:schemeClr val="tx1"/>
+                    </a:solidFill>
+                    <a:latin typeface="Calibri" panose="020F0502020204030204" pitchFamily="34" charset="0"/>
+                  </a:defRPr>
+                </a:lvl6pPr>
+                <a:lvl7pPr marL="2971800" indent="-228600" eaLnBrk="0" fontAlgn="base" hangingPunct="0">
+                  <a:spcBef>
+                    <a:spcPct val="0"/>
+                  </a:spcBef>
+                  <a:spcAft>
+                    <a:spcPct val="0"/>
+                  </a:spcAft>
+                  <a:defRPr>
+                    <a:solidFill>
+                      <a:schemeClr val="tx1"/>
+                    </a:solidFill>
+                    <a:latin typeface="Calibri" panose="020F0502020204030204" pitchFamily="34" charset="0"/>
+                  </a:defRPr>
+                </a:lvl7pPr>
+                <a:lvl8pPr marL="3429000" indent="-228600" eaLnBrk="0" fontAlgn="base" hangingPunct="0">
+                  <a:spcBef>
+                    <a:spcPct val="0"/>
+                  </a:spcBef>
+                  <a:spcAft>
+                    <a:spcPct val="0"/>
+                  </a:spcAft>
+                  <a:defRPr>
+                    <a:solidFill>
+                      <a:schemeClr val="tx1"/>
+                    </a:solidFill>
+                    <a:latin typeface="Calibri" panose="020F0502020204030204" pitchFamily="34" charset="0"/>
+                  </a:defRPr>
+                </a:lvl8pPr>
+                <a:lvl9pPr marL="3886200" indent="-228600" eaLnBrk="0" fontAlgn="base" hangingPunct="0">
+                  <a:spcBef>
+                    <a:spcPct val="0"/>
+                  </a:spcBef>
+                  <a:spcAft>
+                    <a:spcPct val="0"/>
+                  </a:spcAft>
+                  <a:defRPr>
+                    <a:solidFill>
+                      <a:schemeClr val="tx1"/>
+                    </a:solidFill>
+                    <a:latin typeface="Calibri" panose="020F0502020204030204" pitchFamily="34" charset="0"/>
+                  </a:defRPr>
+                </a:lvl9pPr>
+              </a:lstStyle>
+              <a:p>
+                <a:pPr algn="ctr" eaLnBrk="1" hangingPunct="1"/>
+                <a:r>
+                  <a:rPr lang="en-US" altLang="en-US" sz="1100" dirty="0">
+                    <a:latin typeface="Arial" panose="020B0604020202020204" pitchFamily="34" charset="0"/>
+                    <a:cs typeface="Arial" panose="020B0604020202020204" pitchFamily="34" charset="0"/>
+                  </a:rPr>
+                  <a:t>EC2 instance</a:t>
+                </a:r>
+              </a:p>
+            </p:txBody>
+          </p:sp>
+          <p:sp>
+            <p:nvSpPr>
+              <p:cNvPr id="57370" name="Rectangle 37">
+                <a:extLst>
+                  <a:ext uri="{FF2B5EF4-FFF2-40B4-BE49-F238E27FC236}">
+                    <a16:creationId xmlns:a16="http://schemas.microsoft.com/office/drawing/2014/main" id="{725707DC-E3AA-8E4B-9847-7D6AC3F5A683}"/>
+                  </a:ext>
+                </a:extLst>
+              </p:cNvPr>
+              <p:cNvSpPr>
+                <a:spLocks noChangeArrowheads="1"/>
+              </p:cNvSpPr>
+              <p:nvPr/>
+            </p:nvSpPr>
+            <p:spPr bwMode="auto">
+              <a:xfrm>
+                <a:off x="1471162" y="994504"/>
+                <a:ext cx="1425840" cy="276999"/>
+              </a:xfrm>
+              <a:prstGeom prst="rect">
+                <a:avLst/>
+              </a:prstGeom>
+              <a:noFill/>
+              <a:ln>
+                <a:noFill/>
+              </a:ln>
+              <a:extLst>
+                <a:ext uri="{909E8E84-426E-40DD-AFC4-6F175D3DCCD1}">
+                  <a14:hiddenFill xmlns:a14="http://schemas.microsoft.com/office/drawing/2010/main">
+                    <a:solidFill>
+                      <a:srgbClr val="FFFFFF"/>
+                    </a:solidFill>
+                  </a14:hiddenFill>
+                </a:ext>
+                <a:ext uri="{91240B29-F687-4F45-9708-019B960494DF}">
+                  <a14:hiddenLine xmlns:a14="http://schemas.microsoft.com/office/drawing/2010/main" w="9525">
+                    <a:solidFill>
+                      <a:srgbClr val="000000"/>
+                    </a:solidFill>
+                    <a:miter lim="800000"/>
+                    <a:headEnd/>
+                    <a:tailEnd/>
+                  </a14:hiddenLine>
+                </a:ext>
+              </a:extLst>
+            </p:spPr>
+            <p:txBody>
+              <a:bodyPr wrap="none">
+                <a:spAutoFit/>
+              </a:bodyPr>
+              <a:lstStyle>
+                <a:lvl1pPr>
+                  <a:defRPr>
+                    <a:solidFill>
+                      <a:schemeClr val="tx1"/>
+                    </a:solidFill>
+                    <a:latin typeface="Calibri" panose="020F0502020204030204" pitchFamily="34" charset="0"/>
+                  </a:defRPr>
+                </a:lvl1pPr>
+                <a:lvl2pPr marL="742950" indent="-285750">
+                  <a:defRPr>
+                    <a:solidFill>
+                      <a:schemeClr val="tx1"/>
+                    </a:solidFill>
+                    <a:latin typeface="Calibri" panose="020F0502020204030204" pitchFamily="34" charset="0"/>
+                  </a:defRPr>
+                </a:lvl2pPr>
+                <a:lvl3pPr marL="1143000" indent="-228600">
+                  <a:defRPr>
+                    <a:solidFill>
+                      <a:schemeClr val="tx1"/>
+                    </a:solidFill>
+                    <a:latin typeface="Calibri" panose="020F0502020204030204" pitchFamily="34" charset="0"/>
+                  </a:defRPr>
+                </a:lvl3pPr>
+                <a:lvl4pPr marL="1600200" indent="-228600">
+                  <a:defRPr>
+                    <a:solidFill>
+                      <a:schemeClr val="tx1"/>
+                    </a:solidFill>
+                    <a:latin typeface="Calibri" panose="020F0502020204030204" pitchFamily="34" charset="0"/>
+                  </a:defRPr>
+                </a:lvl4pPr>
+                <a:lvl5pPr marL="2057400" indent="-228600">
+                  <a:defRPr>
+                    <a:solidFill>
+                      <a:schemeClr val="tx1"/>
+                    </a:solidFill>
+                    <a:latin typeface="Calibri" panose="020F0502020204030204" pitchFamily="34" charset="0"/>
+                  </a:defRPr>
+                </a:lvl5pPr>
+                <a:lvl6pPr marL="2514600" indent="-228600" eaLnBrk="0" fontAlgn="base" hangingPunct="0">
+                  <a:spcBef>
+                    <a:spcPct val="0"/>
+                  </a:spcBef>
+                  <a:spcAft>
+                    <a:spcPct val="0"/>
+                  </a:spcAft>
+                  <a:defRPr>
+                    <a:solidFill>
+                      <a:schemeClr val="tx1"/>
+                    </a:solidFill>
+                    <a:latin typeface="Calibri" panose="020F0502020204030204" pitchFamily="34" charset="0"/>
+                  </a:defRPr>
+                </a:lvl6pPr>
+                <a:lvl7pPr marL="2971800" indent="-228600" eaLnBrk="0" fontAlgn="base" hangingPunct="0">
+                  <a:spcBef>
+                    <a:spcPct val="0"/>
+                  </a:spcBef>
+                  <a:spcAft>
+                    <a:spcPct val="0"/>
+                  </a:spcAft>
+                  <a:defRPr>
+                    <a:solidFill>
+                      <a:schemeClr val="tx1"/>
+                    </a:solidFill>
+                    <a:latin typeface="Calibri" panose="020F0502020204030204" pitchFamily="34" charset="0"/>
+                  </a:defRPr>
+                </a:lvl7pPr>
+                <a:lvl8pPr marL="3429000" indent="-228600" eaLnBrk="0" fontAlgn="base" hangingPunct="0">
+                  <a:spcBef>
+                    <a:spcPct val="0"/>
+                  </a:spcBef>
+                  <a:spcAft>
+                    <a:spcPct val="0"/>
+                  </a:spcAft>
+                  <a:defRPr>
+                    <a:solidFill>
+                      <a:schemeClr val="tx1"/>
+                    </a:solidFill>
+                    <a:latin typeface="Calibri" panose="020F0502020204030204" pitchFamily="34" charset="0"/>
+                  </a:defRPr>
+                </a:lvl8pPr>
+                <a:lvl9pPr marL="3886200" indent="-228600" eaLnBrk="0" fontAlgn="base" hangingPunct="0">
+                  <a:spcBef>
+                    <a:spcPct val="0"/>
+                  </a:spcBef>
+                  <a:spcAft>
+                    <a:spcPct val="0"/>
+                  </a:spcAft>
+                  <a:defRPr>
+                    <a:solidFill>
+                      <a:schemeClr val="tx1"/>
+                    </a:solidFill>
+                    <a:latin typeface="Calibri" panose="020F0502020204030204" pitchFamily="34" charset="0"/>
+                  </a:defRPr>
+                </a:lvl9pPr>
+              </a:lstStyle>
+              <a:p>
+                <a:pPr algn="ctr" eaLnBrk="1" hangingPunct="1"/>
+                <a:r>
+                  <a:rPr lang="en-US" altLang="en-US" sz="1200" dirty="0">
+                    <a:solidFill>
+                      <a:srgbClr val="5B9CD5"/>
+                    </a:solidFill>
+                    <a:latin typeface="Arial" panose="020B0604020202020204" pitchFamily="34" charset="0"/>
+                    <a:cs typeface="Arial" panose="020B0604020202020204" pitchFamily="34" charset="0"/>
+                  </a:rPr>
+                  <a:t>Availability Zone 1</a:t>
+                </a:r>
+              </a:p>
+            </p:txBody>
+          </p:sp>
+          <p:pic>
+            <p:nvPicPr>
+              <p:cNvPr id="36" name="Graphic 35">
+                <a:extLst>
+                  <a:ext uri="{FF2B5EF4-FFF2-40B4-BE49-F238E27FC236}">
+                    <a16:creationId xmlns:a16="http://schemas.microsoft.com/office/drawing/2014/main" id="{DB8A3391-898C-B74A-BD36-FEA81FD3915C}"/>
+                  </a:ext>
+                </a:extLst>
+              </p:cNvPr>
+              <p:cNvPicPr>
+                <a:picLocks noChangeAspect="1"/>
+              </p:cNvPicPr>
+              <p:nvPr/>
+            </p:nvPicPr>
+            <p:blipFill>
+              <a:blip r:embed="rId3">
+                <a:extLst>
+                  <a:ext uri="{96DAC541-7B7A-43D3-8B79-37D633B846F1}">
+                    <asvg:svgBlip xmlns:asvg="http://schemas.microsoft.com/office/drawing/2016/SVG/main" r:embed="rId4"/>
+                  </a:ext>
+                </a:extLst>
+              </a:blip>
+              <a:srcRect/>
+              <a:stretch/>
+            </p:blipFill>
+            <p:spPr>
+              <a:xfrm>
+                <a:off x="147951" y="521158"/>
+                <a:ext cx="369560" cy="379697"/>
+              </a:xfrm>
+              <a:prstGeom prst="rect">
+                <a:avLst/>
+              </a:prstGeom>
+            </p:spPr>
+          </p:pic>
+          <p:pic>
+            <p:nvPicPr>
+              <p:cNvPr id="37" name="Graphic 36">
+                <a:extLst>
+                  <a:ext uri="{FF2B5EF4-FFF2-40B4-BE49-F238E27FC236}">
+                    <a16:creationId xmlns:a16="http://schemas.microsoft.com/office/drawing/2014/main" id="{733858DB-2483-8C40-95D8-26C416A7C0B3}"/>
+                  </a:ext>
+                </a:extLst>
+              </p:cNvPr>
+              <p:cNvPicPr>
+                <a:picLocks noChangeAspect="1"/>
+              </p:cNvPicPr>
+              <p:nvPr/>
+            </p:nvPicPr>
+            <p:blipFill>
+              <a:blip r:embed="rId5">
+                <a:extLst>
+                  <a:ext uri="{96DAC541-7B7A-43D3-8B79-37D633B846F1}">
+                    <asvg:svgBlip xmlns:asvg="http://schemas.microsoft.com/office/drawing/2016/SVG/main" r:embed="rId6"/>
+                  </a:ext>
+                </a:extLst>
+              </a:blip>
+              <a:stretch>
+                <a:fillRect/>
+              </a:stretch>
+            </p:blipFill>
+            <p:spPr>
+              <a:xfrm>
+                <a:off x="361988" y="1348582"/>
+                <a:ext cx="369560" cy="379697"/>
+              </a:xfrm>
+              <a:prstGeom prst="rect">
+                <a:avLst/>
+              </a:prstGeom>
+            </p:spPr>
+          </p:pic>
+          <p:pic>
+            <p:nvPicPr>
+              <p:cNvPr id="38" name="Graphic 37">
+                <a:extLst>
+                  <a:ext uri="{FF2B5EF4-FFF2-40B4-BE49-F238E27FC236}">
+                    <a16:creationId xmlns:a16="http://schemas.microsoft.com/office/drawing/2014/main" id="{C3702C57-E68F-A046-98A7-621C4393F070}"/>
+                  </a:ext>
+                </a:extLst>
+              </p:cNvPr>
+              <p:cNvPicPr>
+                <a:picLocks noChangeAspect="1"/>
+              </p:cNvPicPr>
+              <p:nvPr/>
+            </p:nvPicPr>
+            <p:blipFill>
+              <a:blip r:embed="rId7">
+                <a:extLst>
+                  <a:ext uri="{96DAC541-7B7A-43D3-8B79-37D633B846F1}">
+                    <asvg:svgBlip xmlns:asvg="http://schemas.microsoft.com/office/drawing/2016/SVG/main" r:embed="rId8"/>
+                  </a:ext>
+                </a:extLst>
+              </a:blip>
+              <a:stretch>
+                <a:fillRect/>
+              </a:stretch>
+            </p:blipFill>
+            <p:spPr>
+              <a:xfrm>
+                <a:off x="1155692" y="1854519"/>
+                <a:ext cx="369560" cy="379697"/>
+              </a:xfrm>
+              <a:prstGeom prst="rect">
+                <a:avLst/>
+              </a:prstGeom>
+            </p:spPr>
+          </p:pic>
+          <p:sp>
+            <p:nvSpPr>
+              <p:cNvPr id="2" name="Oval 1">
+                <a:extLst>
+                  <a:ext uri="{FF2B5EF4-FFF2-40B4-BE49-F238E27FC236}">
+                    <a16:creationId xmlns:a16="http://schemas.microsoft.com/office/drawing/2014/main" id="{67EE18B7-D0B3-7F47-A86D-25788FBA690B}"/>
+                  </a:ext>
+                </a:extLst>
+              </p:cNvPr>
+              <p:cNvSpPr/>
+              <p:nvPr/>
+            </p:nvSpPr>
+            <p:spPr>
+              <a:xfrm>
+                <a:off x="3721586" y="1134191"/>
+                <a:ext cx="401000" cy="420055"/>
+              </a:xfrm>
+              <a:prstGeom prst="ellipse">
+                <a:avLst/>
+              </a:prstGeom>
+              <a:solidFill>
+                <a:schemeClr val="bg1"/>
+              </a:solidFill>
+              <a:ln>
+                <a:noFill/>
+              </a:ln>
+            </p:spPr>
+            <p:style>
+              <a:lnRef idx="2">
+                <a:schemeClr val="accent1">
+                  <a:shade val="50000"/>
+                </a:schemeClr>
+              </a:lnRef>
+              <a:fillRef idx="1">
+                <a:schemeClr val="accent1"/>
+              </a:fillRef>
+              <a:effectRef idx="0">
+                <a:schemeClr val="accent1"/>
+              </a:effectRef>
+              <a:fontRef idx="minor">
+                <a:schemeClr val="lt1"/>
+              </a:fontRef>
+            </p:style>
+            <p:txBody>
+              <a:bodyPr rtlCol="0" anchor="ctr"/>
+              <a:lstStyle/>
+              <a:p>
+                <a:pPr algn="ctr"/>
+                <a:endParaRPr lang="en-US"/>
+              </a:p>
+            </p:txBody>
+          </p:sp>
+          <p:pic>
+            <p:nvPicPr>
+              <p:cNvPr id="39" name="Graphic 19">
+                <a:extLst>
+                  <a:ext uri="{FF2B5EF4-FFF2-40B4-BE49-F238E27FC236}">
+                    <a16:creationId xmlns:a16="http://schemas.microsoft.com/office/drawing/2014/main" id="{FC7BCD5A-9348-9D41-96D6-3D164D147717}"/>
+                  </a:ext>
+                </a:extLst>
+              </p:cNvPr>
+              <p:cNvPicPr>
+                <a:picLocks noChangeAspect="1" noChangeArrowheads="1"/>
+              </p:cNvPicPr>
+              <p:nvPr/>
+            </p:nvPicPr>
+            <p:blipFill>
+              <a:blip r:embed="rId9">
+                <a:extLst>
+                  <a:ext uri="{28A0092B-C50C-407E-A947-70E740481C1C}">
+                    <a14:useLocalDpi xmlns:a14="http://schemas.microsoft.com/office/drawing/2010/main" val="0"/>
+                  </a:ext>
+                </a:extLst>
+              </a:blip>
+              <a:srcRect/>
+              <a:stretch>
+                <a:fillRect/>
+              </a:stretch>
+            </p:blipFill>
+            <p:spPr bwMode="auto">
+              <a:xfrm>
+                <a:off x="3694191" y="1114436"/>
+                <a:ext cx="455791" cy="468293"/>
+              </a:xfrm>
+              <a:prstGeom prst="rect">
+                <a:avLst/>
+              </a:prstGeom>
+              <a:noFill/>
+              <a:ln>
+                <a:noFill/>
+              </a:ln>
+              <a:extLst>
+                <a:ext uri="{909E8E84-426E-40DD-AFC4-6F175D3DCCD1}">
+                  <a14:hiddenFill xmlns:a14="http://schemas.microsoft.com/office/drawing/2010/main">
+                    <a:solidFill>
+                      <a:srgbClr val="FFFFFF"/>
+                    </a:solidFill>
+                  </a14:hiddenFill>
+                </a:ext>
+                <a:ext uri="{91240B29-F687-4F45-9708-019B960494DF}">
+                  <a14:hiddenLine xmlns:a14="http://schemas.microsoft.com/office/drawing/2010/main" w="9525">
+                    <a:solidFill>
+                      <a:srgbClr val="000000"/>
+                    </a:solidFill>
+                    <a:miter lim="800000"/>
+                    <a:headEnd/>
+                    <a:tailEnd/>
+                  </a14:hiddenLine>
+                </a:ext>
+              </a:extLst>
+            </p:spPr>
+          </p:pic>
+          <p:sp>
+            <p:nvSpPr>
+              <p:cNvPr id="57352" name="TextBox 11">
+                <a:extLst>
+                  <a:ext uri="{FF2B5EF4-FFF2-40B4-BE49-F238E27FC236}">
+                    <a16:creationId xmlns:a16="http://schemas.microsoft.com/office/drawing/2014/main" id="{FE4F302E-9270-D44F-B1DC-F0A71F3CF623}"/>
+                  </a:ext>
+                </a:extLst>
+              </p:cNvPr>
+              <p:cNvSpPr txBox="1">
+                <a:spLocks noChangeArrowheads="1"/>
+              </p:cNvSpPr>
+              <p:nvPr/>
+            </p:nvSpPr>
+            <p:spPr bwMode="auto">
+              <a:xfrm>
+                <a:off x="2985082" y="4350258"/>
+                <a:ext cx="1946352" cy="260716"/>
+              </a:xfrm>
+              <a:prstGeom prst="rect">
+                <a:avLst/>
+              </a:prstGeom>
+              <a:solidFill>
+                <a:srgbClr val="FFFFFF"/>
+              </a:solidFill>
+              <a:ln>
+                <a:noFill/>
+              </a:ln>
+              <a:extLst>
+                <a:ext uri="{91240B29-F687-4F45-9708-019B960494DF}">
+                  <a14:hiddenLine xmlns:a14="http://schemas.microsoft.com/office/drawing/2010/main" w="9525">
+                    <a:solidFill>
+                      <a:srgbClr val="000000"/>
+                    </a:solidFill>
+                    <a:miter lim="800000"/>
+                    <a:headEnd/>
+                    <a:tailEnd/>
+                  </a14:hiddenLine>
+                </a:ext>
+              </a:extLst>
+            </p:spPr>
+            <p:txBody>
+              <a:bodyPr>
+                <a:spAutoFit/>
+              </a:bodyPr>
+              <a:lstStyle>
+                <a:lvl1pPr>
+                  <a:defRPr>
+                    <a:solidFill>
+                      <a:schemeClr val="tx1"/>
+                    </a:solidFill>
+                    <a:latin typeface="Calibri" panose="020F0502020204030204" pitchFamily="34" charset="0"/>
+                  </a:defRPr>
+                </a:lvl1pPr>
+                <a:lvl2pPr marL="742950" indent="-285750">
+                  <a:defRPr>
+                    <a:solidFill>
+                      <a:schemeClr val="tx1"/>
+                    </a:solidFill>
+                    <a:latin typeface="Calibri" panose="020F0502020204030204" pitchFamily="34" charset="0"/>
+                  </a:defRPr>
+                </a:lvl2pPr>
+                <a:lvl3pPr marL="1143000" indent="-228600">
+                  <a:defRPr>
+                    <a:solidFill>
+                      <a:schemeClr val="tx1"/>
+                    </a:solidFill>
+                    <a:latin typeface="Calibri" panose="020F0502020204030204" pitchFamily="34" charset="0"/>
+                  </a:defRPr>
+                </a:lvl3pPr>
+                <a:lvl4pPr marL="1600200" indent="-228600">
+                  <a:defRPr>
+                    <a:solidFill>
+                      <a:schemeClr val="tx1"/>
+                    </a:solidFill>
+                    <a:latin typeface="Calibri" panose="020F0502020204030204" pitchFamily="34" charset="0"/>
+                  </a:defRPr>
+                </a:lvl4pPr>
+                <a:lvl5pPr marL="2057400" indent="-228600">
+                  <a:defRPr>
+                    <a:solidFill>
+                      <a:schemeClr val="tx1"/>
+                    </a:solidFill>
+                    <a:latin typeface="Calibri" panose="020F0502020204030204" pitchFamily="34" charset="0"/>
+                  </a:defRPr>
+                </a:lvl5pPr>
+                <a:lvl6pPr marL="2514600" indent="-228600" eaLnBrk="0" fontAlgn="base" hangingPunct="0">
+                  <a:spcBef>
+                    <a:spcPct val="0"/>
+                  </a:spcBef>
+                  <a:spcAft>
+                    <a:spcPct val="0"/>
+                  </a:spcAft>
+                  <a:defRPr>
+                    <a:solidFill>
+                      <a:schemeClr val="tx1"/>
+                    </a:solidFill>
+                    <a:latin typeface="Calibri" panose="020F0502020204030204" pitchFamily="34" charset="0"/>
+                  </a:defRPr>
+                </a:lvl6pPr>
+                <a:lvl7pPr marL="2971800" indent="-228600" eaLnBrk="0" fontAlgn="base" hangingPunct="0">
+                  <a:spcBef>
+                    <a:spcPct val="0"/>
+                  </a:spcBef>
+                  <a:spcAft>
+                    <a:spcPct val="0"/>
+                  </a:spcAft>
+                  <a:defRPr>
+                    <a:solidFill>
+                      <a:schemeClr val="tx1"/>
+                    </a:solidFill>
+                    <a:latin typeface="Calibri" panose="020F0502020204030204" pitchFamily="34" charset="0"/>
+                  </a:defRPr>
+                </a:lvl7pPr>
+                <a:lvl8pPr marL="3429000" indent="-228600" eaLnBrk="0" fontAlgn="base" hangingPunct="0">
+                  <a:spcBef>
+                    <a:spcPct val="0"/>
+                  </a:spcBef>
+                  <a:spcAft>
+                    <a:spcPct val="0"/>
+                  </a:spcAft>
+                  <a:defRPr>
+                    <a:solidFill>
+                      <a:schemeClr val="tx1"/>
+                    </a:solidFill>
+                    <a:latin typeface="Calibri" panose="020F0502020204030204" pitchFamily="34" charset="0"/>
+                  </a:defRPr>
+                </a:lvl8pPr>
+                <a:lvl9pPr marL="3886200" indent="-228600" eaLnBrk="0" fontAlgn="base" hangingPunct="0">
+                  <a:spcBef>
+                    <a:spcPct val="0"/>
+                  </a:spcBef>
+                  <a:spcAft>
+                    <a:spcPct val="0"/>
+                  </a:spcAft>
+                  <a:defRPr>
+                    <a:solidFill>
+                      <a:schemeClr val="tx1"/>
+                    </a:solidFill>
+                    <a:latin typeface="Calibri" panose="020F0502020204030204" pitchFamily="34" charset="0"/>
+                  </a:defRPr>
+                </a:lvl9pPr>
+              </a:lstStyle>
+              <a:p>
+                <a:pPr algn="ctr" eaLnBrk="1" hangingPunct="1"/>
+                <a:r>
+                  <a:rPr lang="en-US" altLang="en-US" sz="1100" dirty="0">
+                    <a:solidFill>
+                      <a:srgbClr val="1E8900"/>
+                    </a:solidFill>
+                    <a:latin typeface="Arial" panose="020B0604020202020204" pitchFamily="34" charset="0"/>
+                    <a:cs typeface="Arial" panose="020B0604020202020204" pitchFamily="34" charset="0"/>
+                  </a:rPr>
+                  <a:t>10.0.0.0/16</a:t>
+                </a:r>
+              </a:p>
+            </p:txBody>
+          </p:sp>
+        </p:grpSp>
         <p:sp>
           <p:nvSpPr>
-            <p:cNvPr id="57352" name="TextBox 11">
+            <p:cNvPr id="20" name="Rectangle 12">
               <a:extLst>
                 <a:ext uri="{FF2B5EF4-FFF2-40B4-BE49-F238E27FC236}">
-                  <a16:creationId xmlns:a16="http://schemas.microsoft.com/office/drawing/2014/main" id="{FE4F302E-9270-D44F-B1DC-F0A71F3CF623}"/>
+                  <a16:creationId xmlns:a16="http://schemas.microsoft.com/office/drawing/2014/main" id="{D10C7536-024D-89C3-48AC-C26F1ADDAC91}"/>
+                </a:ext>
+              </a:extLst>
+            </p:cNvPr>
+            <p:cNvSpPr/>
+            <p:nvPr/>
+          </p:nvSpPr>
+          <p:spPr>
+            <a:xfrm>
+              <a:off x="4677762" y="1859501"/>
+              <a:ext cx="2274219" cy="2276602"/>
+            </a:xfrm>
+            <a:prstGeom prst="rect">
+              <a:avLst/>
+            </a:prstGeom>
+            <a:solidFill>
+              <a:srgbClr val="1D8900">
+                <a:alpha val="9804"/>
+              </a:srgbClr>
+            </a:solidFill>
+            <a:ln w="12700">
+              <a:noFill/>
+              <a:prstDash val="dash"/>
+            </a:ln>
+          </p:spPr>
+          <p:style>
+            <a:lnRef idx="2">
+              <a:schemeClr val="accent1">
+                <a:shade val="50000"/>
+              </a:schemeClr>
+            </a:lnRef>
+            <a:fillRef idx="1">
+              <a:schemeClr val="accent1"/>
+            </a:fillRef>
+            <a:effectRef idx="0">
+              <a:schemeClr val="accent1"/>
+            </a:effectRef>
+            <a:fontRef idx="minor">
+              <a:schemeClr val="lt1"/>
+            </a:fontRef>
+          </p:style>
+          <p:txBody>
+            <a:bodyPr lIns="502920"/>
+            <a:lstStyle/>
+            <a:p>
+              <a:pPr eaLnBrk="1" fontAlgn="auto" hangingPunct="1">
+                <a:spcBef>
+                  <a:spcPts val="0"/>
+                </a:spcBef>
+                <a:spcAft>
+                  <a:spcPts val="0"/>
+                </a:spcAft>
+                <a:defRPr/>
+              </a:pPr>
+              <a:r>
+                <a:rPr lang="en-US" sz="1200" dirty="0">
+                  <a:solidFill>
+                    <a:srgbClr val="1E8900"/>
+                  </a:solidFill>
+                  <a:latin typeface="Arial" panose="020B0604020202020204" pitchFamily="34" charset="0"/>
+                  <a:cs typeface="Arial" panose="020B0604020202020204" pitchFamily="34" charset="0"/>
+                </a:rPr>
+                <a:t>Public subnet 2</a:t>
+              </a:r>
+            </a:p>
+          </p:txBody>
+        </p:sp>
+        <p:pic>
+          <p:nvPicPr>
+            <p:cNvPr id="21" name="Graphic 37">
+              <a:extLst>
+                <a:ext uri="{FF2B5EF4-FFF2-40B4-BE49-F238E27FC236}">
+                  <a16:creationId xmlns:a16="http://schemas.microsoft.com/office/drawing/2014/main" id="{72C05F6E-9AF7-B36D-B7A8-86D4AFCA294B}"/>
+                </a:ext>
+              </a:extLst>
+            </p:cNvPr>
+            <p:cNvPicPr>
+              <a:picLocks noChangeAspect="1"/>
+            </p:cNvPicPr>
+            <p:nvPr/>
+          </p:nvPicPr>
+          <p:blipFill>
+            <a:blip r:embed="rId7">
+              <a:extLst>
+                <a:ext uri="{96DAC541-7B7A-43D3-8B79-37D633B846F1}">
+                  <asvg:svgBlip xmlns:asvg="http://schemas.microsoft.com/office/drawing/2016/SVG/main" r:embed="rId8"/>
+                </a:ext>
+              </a:extLst>
+            </a:blip>
+            <a:stretch>
+              <a:fillRect/>
+            </a:stretch>
+          </p:blipFill>
+          <p:spPr>
+            <a:xfrm>
+              <a:off x="4677762" y="1859501"/>
+              <a:ext cx="369560" cy="379697"/>
+            </a:xfrm>
+            <a:prstGeom prst="rect">
+              <a:avLst/>
+            </a:prstGeom>
+          </p:spPr>
+        </p:pic>
+        <p:sp>
+          <p:nvSpPr>
+            <p:cNvPr id="23" name="Rectangle 37">
+              <a:extLst>
+                <a:ext uri="{FF2B5EF4-FFF2-40B4-BE49-F238E27FC236}">
+                  <a16:creationId xmlns:a16="http://schemas.microsoft.com/office/drawing/2014/main" id="{DF037FEA-1E7C-71AB-AEC7-B666B5614DDA}"/>
+                </a:ext>
+              </a:extLst>
+            </p:cNvPr>
+            <p:cNvSpPr>
+              <a:spLocks noChangeArrowheads="1"/>
+            </p:cNvSpPr>
+            <p:nvPr/>
+          </p:nvSpPr>
+          <p:spPr bwMode="auto">
+            <a:xfrm>
+              <a:off x="5009878" y="978376"/>
+              <a:ext cx="1425840" cy="276999"/>
+            </a:xfrm>
+            <a:prstGeom prst="rect">
+              <a:avLst/>
+            </a:prstGeom>
+            <a:noFill/>
+            <a:ln>
+              <a:noFill/>
+            </a:ln>
+            <a:extLst>
+              <a:ext uri="{909E8E84-426E-40DD-AFC4-6F175D3DCCD1}">
+                <a14:hiddenFill xmlns:a14="http://schemas.microsoft.com/office/drawing/2010/main">
+                  <a:solidFill>
+                    <a:srgbClr val="FFFFFF"/>
+                  </a:solidFill>
+                </a14:hiddenFill>
+              </a:ext>
+              <a:ext uri="{91240B29-F687-4F45-9708-019B960494DF}">
+                <a14:hiddenLine xmlns:a14="http://schemas.microsoft.com/office/drawing/2010/main" w="9525">
+                  <a:solidFill>
+                    <a:srgbClr val="000000"/>
+                  </a:solidFill>
+                  <a:miter lim="800000"/>
+                  <a:headEnd/>
+                  <a:tailEnd/>
+                </a14:hiddenLine>
+              </a:ext>
+            </a:extLst>
+          </p:spPr>
+          <p:txBody>
+            <a:bodyPr wrap="none">
+              <a:spAutoFit/>
+            </a:bodyPr>
+            <a:lstStyle>
+              <a:lvl1pPr>
+                <a:defRPr>
+                  <a:solidFill>
+                    <a:schemeClr val="tx1"/>
+                  </a:solidFill>
+                  <a:latin typeface="Calibri" panose="020F0502020204030204" pitchFamily="34" charset="0"/>
+                </a:defRPr>
+              </a:lvl1pPr>
+              <a:lvl2pPr marL="742950" indent="-285750">
+                <a:defRPr>
+                  <a:solidFill>
+                    <a:schemeClr val="tx1"/>
+                  </a:solidFill>
+                  <a:latin typeface="Calibri" panose="020F0502020204030204" pitchFamily="34" charset="0"/>
+                </a:defRPr>
+              </a:lvl2pPr>
+              <a:lvl3pPr marL="1143000" indent="-228600">
+                <a:defRPr>
+                  <a:solidFill>
+                    <a:schemeClr val="tx1"/>
+                  </a:solidFill>
+                  <a:latin typeface="Calibri" panose="020F0502020204030204" pitchFamily="34" charset="0"/>
+                </a:defRPr>
+              </a:lvl3pPr>
+              <a:lvl4pPr marL="1600200" indent="-228600">
+                <a:defRPr>
+                  <a:solidFill>
+                    <a:schemeClr val="tx1"/>
+                  </a:solidFill>
+                  <a:latin typeface="Calibri" panose="020F0502020204030204" pitchFamily="34" charset="0"/>
+                </a:defRPr>
+              </a:lvl4pPr>
+              <a:lvl5pPr marL="2057400" indent="-228600">
+                <a:defRPr>
+                  <a:solidFill>
+                    <a:schemeClr val="tx1"/>
+                  </a:solidFill>
+                  <a:latin typeface="Calibri" panose="020F0502020204030204" pitchFamily="34" charset="0"/>
+                </a:defRPr>
+              </a:lvl5pPr>
+              <a:lvl6pPr marL="2514600" indent="-228600" eaLnBrk="0" fontAlgn="base" hangingPunct="0">
+                <a:spcBef>
+                  <a:spcPct val="0"/>
+                </a:spcBef>
+                <a:spcAft>
+                  <a:spcPct val="0"/>
+                </a:spcAft>
+                <a:defRPr>
+                  <a:solidFill>
+                    <a:schemeClr val="tx1"/>
+                  </a:solidFill>
+                  <a:latin typeface="Calibri" panose="020F0502020204030204" pitchFamily="34" charset="0"/>
+                </a:defRPr>
+              </a:lvl6pPr>
+              <a:lvl7pPr marL="2971800" indent="-228600" eaLnBrk="0" fontAlgn="base" hangingPunct="0">
+                <a:spcBef>
+                  <a:spcPct val="0"/>
+                </a:spcBef>
+                <a:spcAft>
+                  <a:spcPct val="0"/>
+                </a:spcAft>
+                <a:defRPr>
+                  <a:solidFill>
+                    <a:schemeClr val="tx1"/>
+                  </a:solidFill>
+                  <a:latin typeface="Calibri" panose="020F0502020204030204" pitchFamily="34" charset="0"/>
+                </a:defRPr>
+              </a:lvl7pPr>
+              <a:lvl8pPr marL="3429000" indent="-228600" eaLnBrk="0" fontAlgn="base" hangingPunct="0">
+                <a:spcBef>
+                  <a:spcPct val="0"/>
+                </a:spcBef>
+                <a:spcAft>
+                  <a:spcPct val="0"/>
+                </a:spcAft>
+                <a:defRPr>
+                  <a:solidFill>
+                    <a:schemeClr val="tx1"/>
+                  </a:solidFill>
+                  <a:latin typeface="Calibri" panose="020F0502020204030204" pitchFamily="34" charset="0"/>
+                </a:defRPr>
+              </a:lvl8pPr>
+              <a:lvl9pPr marL="3886200" indent="-228600" eaLnBrk="0" fontAlgn="base" hangingPunct="0">
+                <a:spcBef>
+                  <a:spcPct val="0"/>
+                </a:spcBef>
+                <a:spcAft>
+                  <a:spcPct val="0"/>
+                </a:spcAft>
+                <a:defRPr>
+                  <a:solidFill>
+                    <a:schemeClr val="tx1"/>
+                  </a:solidFill>
+                  <a:latin typeface="Calibri" panose="020F0502020204030204" pitchFamily="34" charset="0"/>
+                </a:defRPr>
+              </a:lvl9pPr>
+            </a:lstStyle>
+            <a:p>
+              <a:pPr algn="ctr" eaLnBrk="1" hangingPunct="1"/>
+              <a:r>
+                <a:rPr lang="en-US" altLang="en-US" sz="1200" dirty="0">
+                  <a:solidFill>
+                    <a:srgbClr val="5B9CD5"/>
+                  </a:solidFill>
+                  <a:latin typeface="Arial" panose="020B0604020202020204" pitchFamily="34" charset="0"/>
+                  <a:cs typeface="Arial" panose="020B0604020202020204" pitchFamily="34" charset="0"/>
+                </a:rPr>
+                <a:t>Availability Zone 2</a:t>
+              </a:r>
+            </a:p>
+          </p:txBody>
+        </p:sp>
+        <p:sp>
+          <p:nvSpPr>
+            <p:cNvPr id="24" name="TextBox 14">
+              <a:extLst>
+                <a:ext uri="{FF2B5EF4-FFF2-40B4-BE49-F238E27FC236}">
+                  <a16:creationId xmlns:a16="http://schemas.microsoft.com/office/drawing/2014/main" id="{167339F9-592A-C316-FC2E-3BF064E310EE}"/>
                 </a:ext>
               </a:extLst>
             </p:cNvPr>
@@ -3936,7 +5842,7 @@
           </p:nvSpPr>
           <p:spPr bwMode="auto">
             <a:xfrm>
-              <a:off x="2945713" y="4485062"/>
+              <a:off x="4884835" y="3677248"/>
               <a:ext cx="1946352" cy="260716"/>
             </a:xfrm>
             <a:prstGeom prst="rect">
@@ -4078,252 +5984,17 @@
                   <a:latin typeface="Arial" panose="020B0604020202020204" pitchFamily="34" charset="0"/>
                   <a:cs typeface="Arial" panose="020B0604020202020204" pitchFamily="34" charset="0"/>
                 </a:rPr>
-                <a:t>10.0.0.0/16</a:t>
-              </a:r>
-            </a:p>
-          </p:txBody>
-        </p:sp>
-        <p:sp>
-          <p:nvSpPr>
-            <p:cNvPr id="13" name="Rectangle 12">
-              <a:extLst>
-                <a:ext uri="{FF2B5EF4-FFF2-40B4-BE49-F238E27FC236}">
-                  <a16:creationId xmlns:a16="http://schemas.microsoft.com/office/drawing/2014/main" id="{3271E081-8C84-1A41-9D73-C477EECE3484}"/>
-                </a:ext>
-              </a:extLst>
-            </p:cNvPr>
-            <p:cNvSpPr/>
-            <p:nvPr/>
-          </p:nvSpPr>
-          <p:spPr>
-            <a:xfrm>
-              <a:off x="786982" y="1914964"/>
-              <a:ext cx="6293829" cy="2276602"/>
-            </a:xfrm>
-            <a:prstGeom prst="rect">
-              <a:avLst/>
-            </a:prstGeom>
-            <a:solidFill>
-              <a:srgbClr val="1D8900">
-                <a:alpha val="9804"/>
-              </a:srgbClr>
-            </a:solidFill>
-            <a:ln w="12700">
-              <a:noFill/>
-              <a:prstDash val="dash"/>
-            </a:ln>
-          </p:spPr>
-          <p:style>
-            <a:lnRef idx="2">
-              <a:schemeClr val="accent1">
-                <a:shade val="50000"/>
-              </a:schemeClr>
-            </a:lnRef>
-            <a:fillRef idx="1">
-              <a:schemeClr val="accent1"/>
-            </a:fillRef>
-            <a:effectRef idx="0">
-              <a:schemeClr val="accent1"/>
-            </a:effectRef>
-            <a:fontRef idx="minor">
-              <a:schemeClr val="lt1"/>
-            </a:fontRef>
-          </p:style>
-          <p:txBody>
-            <a:bodyPr lIns="502920"/>
-            <a:lstStyle/>
-            <a:p>
-              <a:pPr eaLnBrk="1" fontAlgn="auto" hangingPunct="1">
-                <a:spcBef>
-                  <a:spcPts val="0"/>
-                </a:spcBef>
-                <a:spcAft>
-                  <a:spcPts val="0"/>
-                </a:spcAft>
-                <a:defRPr/>
-              </a:pPr>
-              <a:r>
-                <a:rPr lang="en-US" sz="1200" dirty="0">
-                  <a:solidFill>
-                    <a:srgbClr val="1E8900"/>
-                  </a:solidFill>
-                  <a:latin typeface="Arial" panose="020B0604020202020204" pitchFamily="34" charset="0"/>
-                  <a:cs typeface="Arial" panose="020B0604020202020204" pitchFamily="34" charset="0"/>
-                </a:rPr>
-                <a:t>Public subnet</a:t>
-              </a:r>
-            </a:p>
-          </p:txBody>
-        </p:sp>
-        <p:sp>
-          <p:nvSpPr>
-            <p:cNvPr id="57355" name="TextBox 14">
-              <a:extLst>
-                <a:ext uri="{FF2B5EF4-FFF2-40B4-BE49-F238E27FC236}">
-                  <a16:creationId xmlns:a16="http://schemas.microsoft.com/office/drawing/2014/main" id="{C4B73CB0-A9A3-FA4F-B5E5-8E3A6EF2BFAE}"/>
-                </a:ext>
-              </a:extLst>
-            </p:cNvPr>
-            <p:cNvSpPr txBox="1">
-              <a:spLocks noChangeArrowheads="1"/>
-            </p:cNvSpPr>
-            <p:nvPr/>
-          </p:nvSpPr>
-          <p:spPr bwMode="auto">
-            <a:xfrm>
-              <a:off x="2956571" y="3894136"/>
-              <a:ext cx="1946352" cy="260716"/>
-            </a:xfrm>
-            <a:prstGeom prst="rect">
-              <a:avLst/>
-            </a:prstGeom>
-            <a:noFill/>
-            <a:ln>
-              <a:noFill/>
-            </a:ln>
-            <a:extLst>
-              <a:ext uri="{909E8E84-426E-40DD-AFC4-6F175D3DCCD1}">
-                <a14:hiddenFill xmlns:a14="http://schemas.microsoft.com/office/drawing/2010/main">
-                  <a:solidFill>
-                    <a:srgbClr val="FFFFFF"/>
-                  </a:solidFill>
-                </a14:hiddenFill>
-              </a:ext>
-              <a:ext uri="{91240B29-F687-4F45-9708-019B960494DF}">
-                <a14:hiddenLine xmlns:a14="http://schemas.microsoft.com/office/drawing/2010/main" w="9525">
-                  <a:solidFill>
-                    <a:srgbClr val="000000"/>
-                  </a:solidFill>
-                  <a:miter lim="800000"/>
-                  <a:headEnd/>
-                  <a:tailEnd/>
-                </a14:hiddenLine>
-              </a:ext>
-            </a:extLst>
-          </p:spPr>
-          <p:txBody>
-            <a:bodyPr>
-              <a:spAutoFit/>
-            </a:bodyPr>
-            <a:lstStyle>
-              <a:lvl1pPr>
-                <a:defRPr>
-                  <a:solidFill>
-                    <a:schemeClr val="tx1"/>
-                  </a:solidFill>
-                  <a:latin typeface="Calibri" panose="020F0502020204030204" pitchFamily="34" charset="0"/>
-                </a:defRPr>
-              </a:lvl1pPr>
-              <a:lvl2pPr marL="742950" indent="-285750">
-                <a:defRPr>
-                  <a:solidFill>
-                    <a:schemeClr val="tx1"/>
-                  </a:solidFill>
-                  <a:latin typeface="Calibri" panose="020F0502020204030204" pitchFamily="34" charset="0"/>
-                </a:defRPr>
-              </a:lvl2pPr>
-              <a:lvl3pPr marL="1143000" indent="-228600">
-                <a:defRPr>
-                  <a:solidFill>
-                    <a:schemeClr val="tx1"/>
-                  </a:solidFill>
-                  <a:latin typeface="Calibri" panose="020F0502020204030204" pitchFamily="34" charset="0"/>
-                </a:defRPr>
-              </a:lvl3pPr>
-              <a:lvl4pPr marL="1600200" indent="-228600">
-                <a:defRPr>
-                  <a:solidFill>
-                    <a:schemeClr val="tx1"/>
-                  </a:solidFill>
-                  <a:latin typeface="Calibri" panose="020F0502020204030204" pitchFamily="34" charset="0"/>
-                </a:defRPr>
-              </a:lvl4pPr>
-              <a:lvl5pPr marL="2057400" indent="-228600">
-                <a:defRPr>
-                  <a:solidFill>
-                    <a:schemeClr val="tx1"/>
-                  </a:solidFill>
-                  <a:latin typeface="Calibri" panose="020F0502020204030204" pitchFamily="34" charset="0"/>
-                </a:defRPr>
-              </a:lvl5pPr>
-              <a:lvl6pPr marL="2514600" indent="-228600" eaLnBrk="0" fontAlgn="base" hangingPunct="0">
-                <a:spcBef>
-                  <a:spcPct val="0"/>
-                </a:spcBef>
-                <a:spcAft>
-                  <a:spcPct val="0"/>
-                </a:spcAft>
-                <a:defRPr>
-                  <a:solidFill>
-                    <a:schemeClr val="tx1"/>
-                  </a:solidFill>
-                  <a:latin typeface="Calibri" panose="020F0502020204030204" pitchFamily="34" charset="0"/>
-                </a:defRPr>
-              </a:lvl6pPr>
-              <a:lvl7pPr marL="2971800" indent="-228600" eaLnBrk="0" fontAlgn="base" hangingPunct="0">
-                <a:spcBef>
-                  <a:spcPct val="0"/>
-                </a:spcBef>
-                <a:spcAft>
-                  <a:spcPct val="0"/>
-                </a:spcAft>
-                <a:defRPr>
-                  <a:solidFill>
-                    <a:schemeClr val="tx1"/>
-                  </a:solidFill>
-                  <a:latin typeface="Calibri" panose="020F0502020204030204" pitchFamily="34" charset="0"/>
-                </a:defRPr>
-              </a:lvl7pPr>
-              <a:lvl8pPr marL="3429000" indent="-228600" eaLnBrk="0" fontAlgn="base" hangingPunct="0">
-                <a:spcBef>
-                  <a:spcPct val="0"/>
-                </a:spcBef>
-                <a:spcAft>
-                  <a:spcPct val="0"/>
-                </a:spcAft>
-                <a:defRPr>
-                  <a:solidFill>
-                    <a:schemeClr val="tx1"/>
-                  </a:solidFill>
-                  <a:latin typeface="Calibri" panose="020F0502020204030204" pitchFamily="34" charset="0"/>
-                </a:defRPr>
-              </a:lvl8pPr>
-              <a:lvl9pPr marL="3886200" indent="-228600" eaLnBrk="0" fontAlgn="base" hangingPunct="0">
-                <a:spcBef>
-                  <a:spcPct val="0"/>
-                </a:spcBef>
-                <a:spcAft>
-                  <a:spcPct val="0"/>
-                </a:spcAft>
-                <a:defRPr>
-                  <a:solidFill>
-                    <a:schemeClr val="tx1"/>
-                  </a:solidFill>
-                  <a:latin typeface="Calibri" panose="020F0502020204030204" pitchFamily="34" charset="0"/>
-                </a:defRPr>
-              </a:lvl9pPr>
-            </a:lstStyle>
-            <a:p>
-              <a:pPr algn="ctr" eaLnBrk="1" hangingPunct="1"/>
-              <a:r>
-                <a:rPr lang="en-US" altLang="en-US" sz="1100" dirty="0">
-                  <a:solidFill>
-                    <a:srgbClr val="1E8900"/>
-                  </a:solidFill>
-                  <a:latin typeface="Arial" panose="020B0604020202020204" pitchFamily="34" charset="0"/>
-                  <a:cs typeface="Arial" panose="020B0604020202020204" pitchFamily="34" charset="0"/>
-                </a:rPr>
-                <a:t>10.0.0.0/24</a:t>
+                <a:t>10.0.1.0/24</a:t>
               </a:r>
             </a:p>
           </p:txBody>
         </p:sp>
         <p:pic>
           <p:nvPicPr>
-            <p:cNvPr id="57356" name="Graphic 15">
+            <p:cNvPr id="25" name="Graphic 15">
               <a:extLst>
                 <a:ext uri="{FF2B5EF4-FFF2-40B4-BE49-F238E27FC236}">
-                  <a16:creationId xmlns:a16="http://schemas.microsoft.com/office/drawing/2014/main" id="{E0FCDF02-5D7E-4444-8DF1-4F770DE6D18F}"/>
+                  <a16:creationId xmlns:a16="http://schemas.microsoft.com/office/drawing/2014/main" id="{161AE504-26F4-7490-E926-C05A87522B77}"/>
                 </a:ext>
               </a:extLst>
             </p:cNvPr>
@@ -4347,7 +6018,7 @@
           </p:blipFill>
           <p:spPr bwMode="auto">
             <a:xfrm>
-              <a:off x="3701851" y="2644261"/>
+              <a:off x="5630115" y="2427373"/>
               <a:ext cx="455791" cy="468293"/>
             </a:xfrm>
             <a:prstGeom prst="rect">
@@ -4380,10 +6051,10 @@
         </p:pic>
         <p:sp>
           <p:nvSpPr>
-            <p:cNvPr id="57359" name="TextBox 18">
+            <p:cNvPr id="26" name="TextBox 21">
               <a:extLst>
                 <a:ext uri="{FF2B5EF4-FFF2-40B4-BE49-F238E27FC236}">
-                  <a16:creationId xmlns:a16="http://schemas.microsoft.com/office/drawing/2014/main" id="{943B7711-2792-2B41-85BC-9287019BF532}"/>
+                  <a16:creationId xmlns:a16="http://schemas.microsoft.com/office/drawing/2014/main" id="{01D57174-0763-56EA-5CA1-6381E531858F}"/>
                 </a:ext>
               </a:extLst>
             </p:cNvPr>
@@ -4394,167 +6065,7 @@
           </p:nvSpPr>
           <p:spPr bwMode="auto">
             <a:xfrm>
-              <a:off x="3064399" y="1593803"/>
-              <a:ext cx="1715376" cy="260716"/>
-            </a:xfrm>
-            <a:prstGeom prst="rect">
-              <a:avLst/>
-            </a:prstGeom>
-            <a:noFill/>
-            <a:ln>
-              <a:noFill/>
-            </a:ln>
-            <a:extLst>
-              <a:ext uri="{909E8E84-426E-40DD-AFC4-6F175D3DCCD1}">
-                <a14:hiddenFill xmlns:a14="http://schemas.microsoft.com/office/drawing/2010/main">
-                  <a:solidFill>
-                    <a:srgbClr val="FFFFFF"/>
-                  </a:solidFill>
-                </a14:hiddenFill>
-              </a:ext>
-              <a:ext uri="{91240B29-F687-4F45-9708-019B960494DF}">
-                <a14:hiddenLine xmlns:a14="http://schemas.microsoft.com/office/drawing/2010/main" w="9525">
-                  <a:solidFill>
-                    <a:srgbClr val="000000"/>
-                  </a:solidFill>
-                  <a:miter lim="800000"/>
-                  <a:headEnd/>
-                  <a:tailEnd/>
-                </a14:hiddenLine>
-              </a:ext>
-            </a:extLst>
-          </p:spPr>
-          <p:txBody>
-            <a:bodyPr>
-              <a:spAutoFit/>
-            </a:bodyPr>
-            <a:lstStyle>
-              <a:lvl1pPr>
-                <a:defRPr>
-                  <a:solidFill>
-                    <a:schemeClr val="tx1"/>
-                  </a:solidFill>
-                  <a:latin typeface="Calibri" panose="020F0502020204030204" pitchFamily="34" charset="0"/>
-                </a:defRPr>
-              </a:lvl1pPr>
-              <a:lvl2pPr marL="742950" indent="-285750">
-                <a:defRPr>
-                  <a:solidFill>
-                    <a:schemeClr val="tx1"/>
-                  </a:solidFill>
-                  <a:latin typeface="Calibri" panose="020F0502020204030204" pitchFamily="34" charset="0"/>
-                </a:defRPr>
-              </a:lvl2pPr>
-              <a:lvl3pPr marL="1143000" indent="-228600">
-                <a:defRPr>
-                  <a:solidFill>
-                    <a:schemeClr val="tx1"/>
-                  </a:solidFill>
-                  <a:latin typeface="Calibri" panose="020F0502020204030204" pitchFamily="34" charset="0"/>
-                </a:defRPr>
-              </a:lvl3pPr>
-              <a:lvl4pPr marL="1600200" indent="-228600">
-                <a:defRPr>
-                  <a:solidFill>
-                    <a:schemeClr val="tx1"/>
-                  </a:solidFill>
-                  <a:latin typeface="Calibri" panose="020F0502020204030204" pitchFamily="34" charset="0"/>
-                </a:defRPr>
-              </a:lvl4pPr>
-              <a:lvl5pPr marL="2057400" indent="-228600">
-                <a:defRPr>
-                  <a:solidFill>
-                    <a:schemeClr val="tx1"/>
-                  </a:solidFill>
-                  <a:latin typeface="Calibri" panose="020F0502020204030204" pitchFamily="34" charset="0"/>
-                </a:defRPr>
-              </a:lvl5pPr>
-              <a:lvl6pPr marL="2514600" indent="-228600" eaLnBrk="0" fontAlgn="base" hangingPunct="0">
-                <a:spcBef>
-                  <a:spcPct val="0"/>
-                </a:spcBef>
-                <a:spcAft>
-                  <a:spcPct val="0"/>
-                </a:spcAft>
-                <a:defRPr>
-                  <a:solidFill>
-                    <a:schemeClr val="tx1"/>
-                  </a:solidFill>
-                  <a:latin typeface="Calibri" panose="020F0502020204030204" pitchFamily="34" charset="0"/>
-                </a:defRPr>
-              </a:lvl6pPr>
-              <a:lvl7pPr marL="2971800" indent="-228600" eaLnBrk="0" fontAlgn="base" hangingPunct="0">
-                <a:spcBef>
-                  <a:spcPct val="0"/>
-                </a:spcBef>
-                <a:spcAft>
-                  <a:spcPct val="0"/>
-                </a:spcAft>
-                <a:defRPr>
-                  <a:solidFill>
-                    <a:schemeClr val="tx1"/>
-                  </a:solidFill>
-                  <a:latin typeface="Calibri" panose="020F0502020204030204" pitchFamily="34" charset="0"/>
-                </a:defRPr>
-              </a:lvl7pPr>
-              <a:lvl8pPr marL="3429000" indent="-228600" eaLnBrk="0" fontAlgn="base" hangingPunct="0">
-                <a:spcBef>
-                  <a:spcPct val="0"/>
-                </a:spcBef>
-                <a:spcAft>
-                  <a:spcPct val="0"/>
-                </a:spcAft>
-                <a:defRPr>
-                  <a:solidFill>
-                    <a:schemeClr val="tx1"/>
-                  </a:solidFill>
-                  <a:latin typeface="Calibri" panose="020F0502020204030204" pitchFamily="34" charset="0"/>
-                </a:defRPr>
-              </a:lvl8pPr>
-              <a:lvl9pPr marL="3886200" indent="-228600" eaLnBrk="0" fontAlgn="base" hangingPunct="0">
-                <a:spcBef>
-                  <a:spcPct val="0"/>
-                </a:spcBef>
-                <a:spcAft>
-                  <a:spcPct val="0"/>
-                </a:spcAft>
-                <a:defRPr>
-                  <a:solidFill>
-                    <a:schemeClr val="tx1"/>
-                  </a:solidFill>
-                  <a:latin typeface="Calibri" panose="020F0502020204030204" pitchFamily="34" charset="0"/>
-                </a:defRPr>
-              </a:lvl9pPr>
-            </a:lstStyle>
-            <a:p>
-              <a:pPr algn="ctr" eaLnBrk="1" hangingPunct="1"/>
-              <a:r>
-                <a:rPr lang="en-US" altLang="en-US" sz="1100" dirty="0">
-                  <a:latin typeface="Arial" panose="020B0604020202020204" pitchFamily="34" charset="0"/>
-                  <a:cs typeface="Arial" panose="020B0604020202020204" pitchFamily="34" charset="0"/>
-                </a:rPr>
-                <a:t>Internet gateway</a:t>
-              </a:r>
-            </a:p>
-          </p:txBody>
-        </p:sp>
-        <p:sp>
-          <p:nvSpPr>
-            <p:cNvPr id="57362" name="TextBox 21">
-              <a:extLst>
-                <a:ext uri="{FF2B5EF4-FFF2-40B4-BE49-F238E27FC236}">
-                  <a16:creationId xmlns:a16="http://schemas.microsoft.com/office/drawing/2014/main" id="{8E1FED8B-0693-4748-A3FD-BAA06B77A775}"/>
-                </a:ext>
-              </a:extLst>
-            </p:cNvPr>
-            <p:cNvSpPr txBox="1">
-              <a:spLocks noChangeArrowheads="1"/>
-            </p:cNvSpPr>
-            <p:nvPr/>
-          </p:nvSpPr>
-          <p:spPr bwMode="auto">
-            <a:xfrm>
-              <a:off x="3061201" y="3167515"/>
+              <a:off x="4989465" y="2950627"/>
               <a:ext cx="1715376" cy="205887"/>
             </a:xfrm>
             <a:prstGeom prst="rect">
@@ -4698,750 +6209,7 @@
             </a:p>
           </p:txBody>
         </p:sp>
-        <p:sp>
-          <p:nvSpPr>
-            <p:cNvPr id="57370" name="Rectangle 37">
-              <a:extLst>
-                <a:ext uri="{FF2B5EF4-FFF2-40B4-BE49-F238E27FC236}">
-                  <a16:creationId xmlns:a16="http://schemas.microsoft.com/office/drawing/2014/main" id="{725707DC-E3AA-8E4B-9847-7D6AC3F5A683}"/>
-                </a:ext>
-              </a:extLst>
-            </p:cNvPr>
-            <p:cNvSpPr>
-              <a:spLocks noChangeArrowheads="1"/>
-            </p:cNvSpPr>
-            <p:nvPr/>
-          </p:nvSpPr>
-          <p:spPr bwMode="auto">
-            <a:xfrm>
-              <a:off x="3292768" y="847065"/>
-              <a:ext cx="1258638" cy="276052"/>
-            </a:xfrm>
-            <a:prstGeom prst="rect">
-              <a:avLst/>
-            </a:prstGeom>
-            <a:noFill/>
-            <a:ln>
-              <a:noFill/>
-            </a:ln>
-            <a:extLst>
-              <a:ext uri="{909E8E84-426E-40DD-AFC4-6F175D3DCCD1}">
-                <a14:hiddenFill xmlns:a14="http://schemas.microsoft.com/office/drawing/2010/main">
-                  <a:solidFill>
-                    <a:srgbClr val="FFFFFF"/>
-                  </a:solidFill>
-                </a14:hiddenFill>
-              </a:ext>
-              <a:ext uri="{91240B29-F687-4F45-9708-019B960494DF}">
-                <a14:hiddenLine xmlns:a14="http://schemas.microsoft.com/office/drawing/2010/main" w="9525">
-                  <a:solidFill>
-                    <a:srgbClr val="000000"/>
-                  </a:solidFill>
-                  <a:miter lim="800000"/>
-                  <a:headEnd/>
-                  <a:tailEnd/>
-                </a14:hiddenLine>
-              </a:ext>
-            </a:extLst>
-          </p:spPr>
-          <p:txBody>
-            <a:bodyPr wrap="none">
-              <a:spAutoFit/>
-            </a:bodyPr>
-            <a:lstStyle>
-              <a:lvl1pPr>
-                <a:defRPr>
-                  <a:solidFill>
-                    <a:schemeClr val="tx1"/>
-                  </a:solidFill>
-                  <a:latin typeface="Calibri" panose="020F0502020204030204" pitchFamily="34" charset="0"/>
-                </a:defRPr>
-              </a:lvl1pPr>
-              <a:lvl2pPr marL="742950" indent="-285750">
-                <a:defRPr>
-                  <a:solidFill>
-                    <a:schemeClr val="tx1"/>
-                  </a:solidFill>
-                  <a:latin typeface="Calibri" panose="020F0502020204030204" pitchFamily="34" charset="0"/>
-                </a:defRPr>
-              </a:lvl2pPr>
-              <a:lvl3pPr marL="1143000" indent="-228600">
-                <a:defRPr>
-                  <a:solidFill>
-                    <a:schemeClr val="tx1"/>
-                  </a:solidFill>
-                  <a:latin typeface="Calibri" panose="020F0502020204030204" pitchFamily="34" charset="0"/>
-                </a:defRPr>
-              </a:lvl3pPr>
-              <a:lvl4pPr marL="1600200" indent="-228600">
-                <a:defRPr>
-                  <a:solidFill>
-                    <a:schemeClr val="tx1"/>
-                  </a:solidFill>
-                  <a:latin typeface="Calibri" panose="020F0502020204030204" pitchFamily="34" charset="0"/>
-                </a:defRPr>
-              </a:lvl4pPr>
-              <a:lvl5pPr marL="2057400" indent="-228600">
-                <a:defRPr>
-                  <a:solidFill>
-                    <a:schemeClr val="tx1"/>
-                  </a:solidFill>
-                  <a:latin typeface="Calibri" panose="020F0502020204030204" pitchFamily="34" charset="0"/>
-                </a:defRPr>
-              </a:lvl5pPr>
-              <a:lvl6pPr marL="2514600" indent="-228600" eaLnBrk="0" fontAlgn="base" hangingPunct="0">
-                <a:spcBef>
-                  <a:spcPct val="0"/>
-                </a:spcBef>
-                <a:spcAft>
-                  <a:spcPct val="0"/>
-                </a:spcAft>
-                <a:defRPr>
-                  <a:solidFill>
-                    <a:schemeClr val="tx1"/>
-                  </a:solidFill>
-                  <a:latin typeface="Calibri" panose="020F0502020204030204" pitchFamily="34" charset="0"/>
-                </a:defRPr>
-              </a:lvl6pPr>
-              <a:lvl7pPr marL="2971800" indent="-228600" eaLnBrk="0" fontAlgn="base" hangingPunct="0">
-                <a:spcBef>
-                  <a:spcPct val="0"/>
-                </a:spcBef>
-                <a:spcAft>
-                  <a:spcPct val="0"/>
-                </a:spcAft>
-                <a:defRPr>
-                  <a:solidFill>
-                    <a:schemeClr val="tx1"/>
-                  </a:solidFill>
-                  <a:latin typeface="Calibri" panose="020F0502020204030204" pitchFamily="34" charset="0"/>
-                </a:defRPr>
-              </a:lvl7pPr>
-              <a:lvl8pPr marL="3429000" indent="-228600" eaLnBrk="0" fontAlgn="base" hangingPunct="0">
-                <a:spcBef>
-                  <a:spcPct val="0"/>
-                </a:spcBef>
-                <a:spcAft>
-                  <a:spcPct val="0"/>
-                </a:spcAft>
-                <a:defRPr>
-                  <a:solidFill>
-                    <a:schemeClr val="tx1"/>
-                  </a:solidFill>
-                  <a:latin typeface="Calibri" panose="020F0502020204030204" pitchFamily="34" charset="0"/>
-                </a:defRPr>
-              </a:lvl8pPr>
-              <a:lvl9pPr marL="3886200" indent="-228600" eaLnBrk="0" fontAlgn="base" hangingPunct="0">
-                <a:spcBef>
-                  <a:spcPct val="0"/>
-                </a:spcBef>
-                <a:spcAft>
-                  <a:spcPct val="0"/>
-                </a:spcAft>
-                <a:defRPr>
-                  <a:solidFill>
-                    <a:schemeClr val="tx1"/>
-                  </a:solidFill>
-                  <a:latin typeface="Calibri" panose="020F0502020204030204" pitchFamily="34" charset="0"/>
-                </a:defRPr>
-              </a:lvl9pPr>
-            </a:lstStyle>
-            <a:p>
-              <a:pPr algn="ctr" eaLnBrk="1" hangingPunct="1"/>
-              <a:r>
-                <a:rPr lang="en-US" altLang="en-US" sz="1200" dirty="0">
-                  <a:solidFill>
-                    <a:srgbClr val="5B9CD5"/>
-                  </a:solidFill>
-                  <a:latin typeface="Arial" panose="020B0604020202020204" pitchFamily="34" charset="0"/>
-                  <a:cs typeface="Arial" panose="020B0604020202020204" pitchFamily="34" charset="0"/>
-                </a:rPr>
-                <a:t>Availability Zone</a:t>
-              </a:r>
-            </a:p>
-          </p:txBody>
-        </p:sp>
-        <p:pic>
-          <p:nvPicPr>
-            <p:cNvPr id="36" name="Graphic 35">
-              <a:extLst>
-                <a:ext uri="{FF2B5EF4-FFF2-40B4-BE49-F238E27FC236}">
-                  <a16:creationId xmlns:a16="http://schemas.microsoft.com/office/drawing/2014/main" id="{DB8A3391-898C-B74A-BD36-FEA81FD3915C}"/>
-                </a:ext>
-              </a:extLst>
-            </p:cNvPr>
-            <p:cNvPicPr>
-              <a:picLocks noChangeAspect="1"/>
-            </p:cNvPicPr>
-            <p:nvPr/>
-          </p:nvPicPr>
-          <p:blipFill>
-            <a:blip r:embed="rId3">
-              <a:extLst>
-                <a:ext uri="{96DAC541-7B7A-43D3-8B79-37D633B846F1}">
-                  <asvg:svgBlip xmlns:asvg="http://schemas.microsoft.com/office/drawing/2016/SVG/main" r:embed="rId4"/>
-                </a:ext>
-              </a:extLst>
-            </a:blip>
-            <a:srcRect/>
-            <a:stretch/>
-          </p:blipFill>
-          <p:spPr>
-            <a:xfrm>
-              <a:off x="147951" y="521158"/>
-              <a:ext cx="369560" cy="379697"/>
-            </a:xfrm>
-            <a:prstGeom prst="rect">
-              <a:avLst/>
-            </a:prstGeom>
-          </p:spPr>
-        </p:pic>
-        <p:pic>
-          <p:nvPicPr>
-            <p:cNvPr id="37" name="Graphic 36">
-              <a:extLst>
-                <a:ext uri="{FF2B5EF4-FFF2-40B4-BE49-F238E27FC236}">
-                  <a16:creationId xmlns:a16="http://schemas.microsoft.com/office/drawing/2014/main" id="{733858DB-2483-8C40-95D8-26C416A7C0B3}"/>
-                </a:ext>
-              </a:extLst>
-            </p:cNvPr>
-            <p:cNvPicPr>
-              <a:picLocks noChangeAspect="1"/>
-            </p:cNvPicPr>
-            <p:nvPr/>
-          </p:nvPicPr>
-          <p:blipFill>
-            <a:blip r:embed="rId5">
-              <a:extLst>
-                <a:ext uri="{96DAC541-7B7A-43D3-8B79-37D633B846F1}">
-                  <asvg:svgBlip xmlns:asvg="http://schemas.microsoft.com/office/drawing/2016/SVG/main" r:embed="rId6"/>
-                </a:ext>
-              </a:extLst>
-            </a:blip>
-            <a:stretch>
-              <a:fillRect/>
-            </a:stretch>
-          </p:blipFill>
-          <p:spPr>
-            <a:xfrm>
-              <a:off x="361988" y="1348582"/>
-              <a:ext cx="369560" cy="379697"/>
-            </a:xfrm>
-            <a:prstGeom prst="rect">
-              <a:avLst/>
-            </a:prstGeom>
-          </p:spPr>
-        </p:pic>
-        <p:pic>
-          <p:nvPicPr>
-            <p:cNvPr id="38" name="Graphic 37">
-              <a:extLst>
-                <a:ext uri="{FF2B5EF4-FFF2-40B4-BE49-F238E27FC236}">
-                  <a16:creationId xmlns:a16="http://schemas.microsoft.com/office/drawing/2014/main" id="{C3702C57-E68F-A046-98A7-621C4393F070}"/>
-                </a:ext>
-              </a:extLst>
-            </p:cNvPr>
-            <p:cNvPicPr>
-              <a:picLocks noChangeAspect="1"/>
-            </p:cNvPicPr>
-            <p:nvPr/>
-          </p:nvPicPr>
-          <p:blipFill>
-            <a:blip r:embed="rId7">
-              <a:extLst>
-                <a:ext uri="{96DAC541-7B7A-43D3-8B79-37D633B846F1}">
-                  <asvg:svgBlip xmlns:asvg="http://schemas.microsoft.com/office/drawing/2016/SVG/main" r:embed="rId8"/>
-                </a:ext>
-              </a:extLst>
-            </a:blip>
-            <a:stretch>
-              <a:fillRect/>
-            </a:stretch>
-          </p:blipFill>
-          <p:spPr>
-            <a:xfrm>
-              <a:off x="786982" y="1914964"/>
-              <a:ext cx="369560" cy="379697"/>
-            </a:xfrm>
-            <a:prstGeom prst="rect">
-              <a:avLst/>
-            </a:prstGeom>
-          </p:spPr>
-        </p:pic>
-        <p:sp>
-          <p:nvSpPr>
-            <p:cNvPr id="2" name="Oval 1">
-              <a:extLst>
-                <a:ext uri="{FF2B5EF4-FFF2-40B4-BE49-F238E27FC236}">
-                  <a16:creationId xmlns:a16="http://schemas.microsoft.com/office/drawing/2014/main" id="{67EE18B7-D0B3-7F47-A86D-25788FBA690B}"/>
-                </a:ext>
-              </a:extLst>
-            </p:cNvPr>
-            <p:cNvSpPr/>
-            <p:nvPr/>
-          </p:nvSpPr>
-          <p:spPr>
-            <a:xfrm>
-              <a:off x="3721586" y="1134191"/>
-              <a:ext cx="401000" cy="420055"/>
-            </a:xfrm>
-            <a:prstGeom prst="ellipse">
-              <a:avLst/>
-            </a:prstGeom>
-            <a:solidFill>
-              <a:schemeClr val="bg1"/>
-            </a:solidFill>
-            <a:ln>
-              <a:noFill/>
-            </a:ln>
-          </p:spPr>
-          <p:style>
-            <a:lnRef idx="2">
-              <a:schemeClr val="accent1">
-                <a:shade val="50000"/>
-              </a:schemeClr>
-            </a:lnRef>
-            <a:fillRef idx="1">
-              <a:schemeClr val="accent1"/>
-            </a:fillRef>
-            <a:effectRef idx="0">
-              <a:schemeClr val="accent1"/>
-            </a:effectRef>
-            <a:fontRef idx="minor">
-              <a:schemeClr val="lt1"/>
-            </a:fontRef>
-          </p:style>
-          <p:txBody>
-            <a:bodyPr rtlCol="0" anchor="ctr"/>
-            <a:lstStyle/>
-            <a:p>
-              <a:pPr algn="ctr"/>
-              <a:endParaRPr lang="en-US"/>
-            </a:p>
-          </p:txBody>
-        </p:sp>
-        <p:pic>
-          <p:nvPicPr>
-            <p:cNvPr id="39" name="Graphic 19">
-              <a:extLst>
-                <a:ext uri="{FF2B5EF4-FFF2-40B4-BE49-F238E27FC236}">
-                  <a16:creationId xmlns:a16="http://schemas.microsoft.com/office/drawing/2014/main" id="{FC7BCD5A-9348-9D41-96D6-3D164D147717}"/>
-                </a:ext>
-              </a:extLst>
-            </p:cNvPr>
-            <p:cNvPicPr>
-              <a:picLocks noChangeAspect="1" noChangeArrowheads="1"/>
-            </p:cNvPicPr>
-            <p:nvPr/>
-          </p:nvPicPr>
-          <p:blipFill>
-            <a:blip r:embed="rId9">
-              <a:extLst>
-                <a:ext uri="{28A0092B-C50C-407E-A947-70E740481C1C}">
-                  <a14:useLocalDpi xmlns:a14="http://schemas.microsoft.com/office/drawing/2010/main" val="0"/>
-                </a:ext>
-              </a:extLst>
-            </a:blip>
-            <a:srcRect/>
-            <a:stretch>
-              <a:fillRect/>
-            </a:stretch>
-          </p:blipFill>
-          <p:spPr bwMode="auto">
-            <a:xfrm>
-              <a:off x="3694191" y="1114436"/>
-              <a:ext cx="455791" cy="468293"/>
-            </a:xfrm>
-            <a:prstGeom prst="rect">
-              <a:avLst/>
-            </a:prstGeom>
-            <a:noFill/>
-            <a:ln>
-              <a:noFill/>
-            </a:ln>
-            <a:extLst>
-              <a:ext uri="{909E8E84-426E-40DD-AFC4-6F175D3DCCD1}">
-                <a14:hiddenFill xmlns:a14="http://schemas.microsoft.com/office/drawing/2010/main">
-                  <a:solidFill>
-                    <a:srgbClr val="FFFFFF"/>
-                  </a:solidFill>
-                </a14:hiddenFill>
-              </a:ext>
-              <a:ext uri="{91240B29-F687-4F45-9708-019B960494DF}">
-                <a14:hiddenLine xmlns:a14="http://schemas.microsoft.com/office/drawing/2010/main" w="9525">
-                  <a:solidFill>
-                    <a:srgbClr val="000000"/>
-                  </a:solidFill>
-                  <a:miter lim="800000"/>
-                  <a:headEnd/>
-                  <a:tailEnd/>
-                </a14:hiddenLine>
-              </a:ext>
-            </a:extLst>
-          </p:spPr>
-        </p:pic>
       </p:grpSp>
-      <p:sp>
-        <p:nvSpPr>
-          <p:cNvPr id="42" name="Rectangle 5">
-            <a:extLst>
-              <a:ext uri="{FF2B5EF4-FFF2-40B4-BE49-F238E27FC236}">
-                <a16:creationId xmlns:a16="http://schemas.microsoft.com/office/drawing/2014/main" id="{1ABA8BC9-E0EC-7D1D-06CE-C7345ACE0C16}"/>
-              </a:ext>
-            </a:extLst>
-          </p:cNvPr>
-          <p:cNvSpPr>
-            <a:spLocks noChangeArrowheads="1"/>
-          </p:cNvSpPr>
-          <p:nvPr/>
-        </p:nvSpPr>
-        <p:spPr bwMode="auto">
-          <a:xfrm>
-            <a:off x="7957450" y="2365711"/>
-            <a:ext cx="2730255" cy="2960875"/>
-          </a:xfrm>
-          <a:prstGeom prst="rect">
-            <a:avLst/>
-          </a:prstGeom>
-          <a:noFill/>
-          <a:ln>
-            <a:noFill/>
-          </a:ln>
-          <a:extLst>
-            <a:ext uri="{909E8E84-426E-40DD-AFC4-6F175D3DCCD1}">
-              <a14:hiddenFill xmlns:a14="http://schemas.microsoft.com/office/drawing/2010/main">
-                <a:solidFill>
-                  <a:srgbClr val="FFFFFF"/>
-                </a:solidFill>
-              </a14:hiddenFill>
-            </a:ext>
-            <a:ext uri="{91240B29-F687-4F45-9708-019B960494DF}">
-              <a14:hiddenLine xmlns:a14="http://schemas.microsoft.com/office/drawing/2010/main" w="9525">
-                <a:solidFill>
-                  <a:srgbClr val="000000"/>
-                </a:solidFill>
-                <a:miter lim="800000"/>
-                <a:headEnd/>
-                <a:tailEnd/>
-              </a14:hiddenLine>
-            </a:ext>
-          </a:extLst>
-        </p:spPr>
-        <p:txBody>
-          <a:bodyPr wrap="square">
-            <a:spAutoFit/>
-          </a:bodyPr>
-          <a:lstStyle>
-            <a:lvl1pPr marL="228600" indent="-228600">
-              <a:defRPr>
-                <a:solidFill>
-                  <a:schemeClr val="tx1"/>
-                </a:solidFill>
-                <a:latin typeface="Calibri" panose="020F0502020204030204" pitchFamily="34" charset="0"/>
-              </a:defRPr>
-            </a:lvl1pPr>
-            <a:lvl2pPr marL="742950" indent="-285750">
-              <a:defRPr>
-                <a:solidFill>
-                  <a:schemeClr val="tx1"/>
-                </a:solidFill>
-                <a:latin typeface="Calibri" panose="020F0502020204030204" pitchFamily="34" charset="0"/>
-              </a:defRPr>
-            </a:lvl2pPr>
-            <a:lvl3pPr marL="1143000" indent="-228600">
-              <a:defRPr>
-                <a:solidFill>
-                  <a:schemeClr val="tx1"/>
-                </a:solidFill>
-                <a:latin typeface="Calibri" panose="020F0502020204030204" pitchFamily="34" charset="0"/>
-              </a:defRPr>
-            </a:lvl3pPr>
-            <a:lvl4pPr marL="1600200" indent="-228600">
-              <a:defRPr>
-                <a:solidFill>
-                  <a:schemeClr val="tx1"/>
-                </a:solidFill>
-                <a:latin typeface="Calibri" panose="020F0502020204030204" pitchFamily="34" charset="0"/>
-              </a:defRPr>
-            </a:lvl4pPr>
-            <a:lvl5pPr marL="2057400" indent="-228600">
-              <a:defRPr>
-                <a:solidFill>
-                  <a:schemeClr val="tx1"/>
-                </a:solidFill>
-                <a:latin typeface="Calibri" panose="020F0502020204030204" pitchFamily="34" charset="0"/>
-              </a:defRPr>
-            </a:lvl5pPr>
-            <a:lvl6pPr marL="2514600" indent="-228600" eaLnBrk="0" fontAlgn="base" hangingPunct="0">
-              <a:spcBef>
-                <a:spcPct val="0"/>
-              </a:spcBef>
-              <a:spcAft>
-                <a:spcPct val="0"/>
-              </a:spcAft>
-              <a:defRPr>
-                <a:solidFill>
-                  <a:schemeClr val="tx1"/>
-                </a:solidFill>
-                <a:latin typeface="Calibri" panose="020F0502020204030204" pitchFamily="34" charset="0"/>
-              </a:defRPr>
-            </a:lvl6pPr>
-            <a:lvl7pPr marL="2971800" indent="-228600" eaLnBrk="0" fontAlgn="base" hangingPunct="0">
-              <a:spcBef>
-                <a:spcPct val="0"/>
-              </a:spcBef>
-              <a:spcAft>
-                <a:spcPct val="0"/>
-              </a:spcAft>
-              <a:defRPr>
-                <a:solidFill>
-                  <a:schemeClr val="tx1"/>
-                </a:solidFill>
-                <a:latin typeface="Calibri" panose="020F0502020204030204" pitchFamily="34" charset="0"/>
-              </a:defRPr>
-            </a:lvl7pPr>
-            <a:lvl8pPr marL="3429000" indent="-228600" eaLnBrk="0" fontAlgn="base" hangingPunct="0">
-              <a:spcBef>
-                <a:spcPct val="0"/>
-              </a:spcBef>
-              <a:spcAft>
-                <a:spcPct val="0"/>
-              </a:spcAft>
-              <a:defRPr>
-                <a:solidFill>
-                  <a:schemeClr val="tx1"/>
-                </a:solidFill>
-                <a:latin typeface="Calibri" panose="020F0502020204030204" pitchFamily="34" charset="0"/>
-              </a:defRPr>
-            </a:lvl8pPr>
-            <a:lvl9pPr marL="3886200" indent="-228600" eaLnBrk="0" fontAlgn="base" hangingPunct="0">
-              <a:spcBef>
-                <a:spcPct val="0"/>
-              </a:spcBef>
-              <a:spcAft>
-                <a:spcPct val="0"/>
-              </a:spcAft>
-              <a:defRPr>
-                <a:solidFill>
-                  <a:schemeClr val="tx1"/>
-                </a:solidFill>
-                <a:latin typeface="Calibri" panose="020F0502020204030204" pitchFamily="34" charset="0"/>
-              </a:defRPr>
-            </a:lvl9pPr>
-          </a:lstStyle>
-          <a:p>
-            <a:pPr eaLnBrk="1" hangingPunct="1">
-              <a:lnSpc>
-                <a:spcPct val="150000"/>
-              </a:lnSpc>
-              <a:buFontTx/>
-              <a:buAutoNum type="arabicPeriod"/>
-            </a:pPr>
-            <a:r>
-              <a:rPr lang="en-US" altLang="en-US" sz="1400" dirty="0">
-                <a:latin typeface="Arial" panose="020B0604020202020204" pitchFamily="34" charset="0"/>
-                <a:cs typeface="Arial" panose="020B0604020202020204" pitchFamily="34" charset="0"/>
-              </a:rPr>
-              <a:t>AWS us-east-1.</a:t>
-            </a:r>
-          </a:p>
-          <a:p>
-            <a:pPr>
-              <a:lnSpc>
-                <a:spcPct val="150000"/>
-              </a:lnSpc>
-              <a:buFontTx/>
-              <a:buAutoNum type="arabicPeriod"/>
-            </a:pPr>
-            <a:r>
-              <a:rPr lang="en-US" altLang="en-US" sz="1400" dirty="0">
-                <a:latin typeface="Arial" panose="020B0604020202020204" pitchFamily="34" charset="0"/>
-                <a:cs typeface="Arial" panose="020B0604020202020204" pitchFamily="34" charset="0"/>
-              </a:rPr>
-              <a:t>VPC: </a:t>
-            </a:r>
-            <a:r>
-              <a:rPr lang="pt-BR" sz="1400" dirty="0">
-                <a:latin typeface="Arial" panose="020B0604020202020204" pitchFamily="34" charset="0"/>
-                <a:cs typeface="Arial" panose="020B0604020202020204" pitchFamily="34" charset="0"/>
-              </a:rPr>
-              <a:t>10.0.0.0/16.</a:t>
-            </a:r>
-          </a:p>
-          <a:p>
-            <a:pPr>
-              <a:lnSpc>
-                <a:spcPct val="150000"/>
-              </a:lnSpc>
-              <a:buFontTx/>
-              <a:buAutoNum type="arabicPeriod"/>
-            </a:pPr>
-            <a:r>
-              <a:rPr lang="pt-BR" sz="1400" dirty="0" err="1">
-                <a:latin typeface="Arial" panose="020B0604020202020204" pitchFamily="34" charset="0"/>
-                <a:cs typeface="Arial" panose="020B0604020202020204" pitchFamily="34" charset="0"/>
-              </a:rPr>
-              <a:t>Public</a:t>
-            </a:r>
-            <a:r>
-              <a:rPr lang="pt-BR" sz="1400" dirty="0">
-                <a:latin typeface="Arial" panose="020B0604020202020204" pitchFamily="34" charset="0"/>
-                <a:cs typeface="Arial" panose="020B0604020202020204" pitchFamily="34" charset="0"/>
-              </a:rPr>
-              <a:t> </a:t>
-            </a:r>
-            <a:r>
-              <a:rPr lang="pt-BR" sz="1400" dirty="0" err="1">
-                <a:latin typeface="Arial" panose="020B0604020202020204" pitchFamily="34" charset="0"/>
-                <a:cs typeface="Arial" panose="020B0604020202020204" pitchFamily="34" charset="0"/>
-              </a:rPr>
-              <a:t>subnet</a:t>
-            </a:r>
-            <a:r>
-              <a:rPr lang="pt-BR" sz="1400" dirty="0">
-                <a:latin typeface="Arial" panose="020B0604020202020204" pitchFamily="34" charset="0"/>
-                <a:cs typeface="Arial" panose="020B0604020202020204" pitchFamily="34" charset="0"/>
-              </a:rPr>
-              <a:t>: 10.0.0.0/24</a:t>
-            </a:r>
-          </a:p>
-          <a:p>
-            <a:pPr>
-              <a:lnSpc>
-                <a:spcPct val="150000"/>
-              </a:lnSpc>
-              <a:buFontTx/>
-              <a:buAutoNum type="arabicPeriod"/>
-            </a:pPr>
-            <a:r>
-              <a:rPr lang="pt-BR" sz="1400" dirty="0">
-                <a:latin typeface="Arial" panose="020B0604020202020204" pitchFamily="34" charset="0"/>
-                <a:cs typeface="Arial" panose="020B0604020202020204" pitchFamily="34" charset="0"/>
-              </a:rPr>
-              <a:t>Security </a:t>
-            </a:r>
-            <a:r>
-              <a:rPr lang="pt-BR" sz="1400" dirty="0" err="1">
-                <a:latin typeface="Arial" panose="020B0604020202020204" pitchFamily="34" charset="0"/>
-                <a:cs typeface="Arial" panose="020B0604020202020204" pitchFamily="34" charset="0"/>
-              </a:rPr>
-              <a:t>group</a:t>
-            </a:r>
-            <a:r>
-              <a:rPr lang="pt-BR" sz="1400" dirty="0">
-                <a:latin typeface="Arial" panose="020B0604020202020204" pitchFamily="34" charset="0"/>
-                <a:cs typeface="Arial" panose="020B0604020202020204" pitchFamily="34" charset="0"/>
-              </a:rPr>
-              <a:t>: </a:t>
-            </a:r>
-            <a:r>
-              <a:rPr lang="pt-BR" sz="1400" dirty="0" err="1">
-                <a:latin typeface="Arial" panose="020B0604020202020204" pitchFamily="34" charset="0"/>
-                <a:cs typeface="Arial" panose="020B0604020202020204" pitchFamily="34" charset="0"/>
-              </a:rPr>
-              <a:t>Nginx</a:t>
-            </a:r>
-            <a:endParaRPr lang="pt-BR" sz="1400" dirty="0">
-              <a:latin typeface="Arial" panose="020B0604020202020204" pitchFamily="34" charset="0"/>
-              <a:cs typeface="Arial" panose="020B0604020202020204" pitchFamily="34" charset="0"/>
-            </a:endParaRPr>
-          </a:p>
-          <a:p>
-            <a:pPr>
-              <a:lnSpc>
-                <a:spcPct val="150000"/>
-              </a:lnSpc>
-              <a:buFontTx/>
-              <a:buAutoNum type="arabicPeriod"/>
-            </a:pPr>
-            <a:r>
-              <a:rPr lang="pt-BR" sz="1400" b="0" dirty="0" err="1">
-                <a:solidFill>
-                  <a:srgbClr val="9CDCFE"/>
-                </a:solidFill>
-                <a:effectLst/>
-                <a:latin typeface="Consolas" panose="020B0609020204030204" pitchFamily="49" charset="0"/>
-              </a:rPr>
-              <a:t>Instance</a:t>
-            </a:r>
-            <a:r>
-              <a:rPr lang="pt-BR" sz="1400" b="0" dirty="0">
-                <a:solidFill>
-                  <a:srgbClr val="9CDCFE"/>
-                </a:solidFill>
-                <a:effectLst/>
-                <a:latin typeface="Consolas" panose="020B0609020204030204" pitchFamily="49" charset="0"/>
-              </a:rPr>
-              <a:t>: </a:t>
-            </a:r>
-            <a:r>
-              <a:rPr lang="pt-BR" sz="1400" b="0" dirty="0">
-                <a:solidFill>
-                  <a:srgbClr val="CE9178"/>
-                </a:solidFill>
-                <a:effectLst/>
-                <a:latin typeface="Consolas" panose="020B0609020204030204" pitchFamily="49" charset="0"/>
-              </a:rPr>
-              <a:t>t2.micro</a:t>
-            </a:r>
-          </a:p>
-          <a:p>
-            <a:pPr>
-              <a:lnSpc>
-                <a:spcPct val="150000"/>
-              </a:lnSpc>
-              <a:buFontTx/>
-              <a:buAutoNum type="arabicPeriod"/>
-            </a:pPr>
-            <a:r>
-              <a:rPr lang="pt-BR" sz="1400" b="0" dirty="0">
-                <a:solidFill>
-                  <a:srgbClr val="CE9178"/>
-                </a:solidFill>
-                <a:effectLst/>
-                <a:latin typeface="Consolas" panose="020B0609020204030204" pitchFamily="49" charset="0"/>
-              </a:rPr>
-              <a:t>Ami: amzn2-ami-hvm-x86_64-gp2</a:t>
-            </a:r>
-            <a:endParaRPr lang="pt-BR" sz="1400" b="0" dirty="0">
-              <a:solidFill>
-                <a:srgbClr val="D4D4D4"/>
-              </a:solidFill>
-              <a:effectLst/>
-              <a:latin typeface="Consolas" panose="020B0609020204030204" pitchFamily="49" charset="0"/>
-            </a:endParaRPr>
-          </a:p>
-          <a:p>
-            <a:pPr>
-              <a:lnSpc>
-                <a:spcPct val="150000"/>
-              </a:lnSpc>
-              <a:buFontTx/>
-              <a:buAutoNum type="arabicPeriod"/>
-            </a:pPr>
-            <a:endParaRPr lang="pt-BR" sz="1400" b="0" dirty="0">
-              <a:solidFill>
-                <a:srgbClr val="D4D4D4"/>
-              </a:solidFill>
-              <a:effectLst/>
-              <a:latin typeface="Consolas" panose="020B0609020204030204" pitchFamily="49" charset="0"/>
-            </a:endParaRPr>
-          </a:p>
-          <a:p>
-            <a:pPr>
-              <a:lnSpc>
-                <a:spcPct val="150000"/>
-              </a:lnSpc>
-              <a:buFontTx/>
-              <a:buAutoNum type="arabicPeriod"/>
-            </a:pPr>
-            <a:endParaRPr lang="pt-BR" sz="1400" dirty="0">
-              <a:latin typeface="Arial" panose="020B0604020202020204" pitchFamily="34" charset="0"/>
-              <a:cs typeface="Arial" panose="020B0604020202020204" pitchFamily="34" charset="0"/>
-            </a:endParaRPr>
-          </a:p>
-        </p:txBody>
-      </p:sp>
     </p:spTree>
     <p:extLst>
       <p:ext uri="{BB962C8B-B14F-4D97-AF65-F5344CB8AC3E}">

</xml_diff>